<commit_message>
Sweep Mode: - fix bug that would not set "return to start" Boolean
</commit_message>
<xml_diff>
--- a/documentation/Lockin.pptx
+++ b/documentation/Lockin.pptx
@@ -8,6 +8,7 @@
     <p:sldId id="256" r:id="rId2"/>
     <p:sldId id="257" r:id="rId3"/>
     <p:sldId id="258" r:id="rId4"/>
+    <p:sldId id="260" r:id="rId5"/>
   </p:sldIdLst>
   <p:sldSz cx="12192000" cy="6858000"/>
   <p:notesSz cx="6858000" cy="9144000"/>
@@ -9727,6 +9728,3181 @@
 </p:sld>
 </file>
 
+<file path=ppt/slides/slide4.xml><?xml version="1.0" encoding="utf-8"?>
+<p:sld xmlns:a="http://schemas.openxmlformats.org/drawingml/2006/main" xmlns:r="http://schemas.openxmlformats.org/officeDocument/2006/relationships" xmlns:p="http://schemas.openxmlformats.org/presentationml/2006/main">
+  <p:cSld>
+    <p:spTree>
+      <p:nvGrpSpPr>
+        <p:cNvPr id="1" name=""/>
+        <p:cNvGrpSpPr/>
+        <p:nvPr/>
+      </p:nvGrpSpPr>
+      <p:grpSpPr>
+        <a:xfrm>
+          <a:off x="0" y="0"/>
+          <a:ext cx="0" cy="0"/>
+          <a:chOff x="0" y="0"/>
+          <a:chExt cx="0" cy="0"/>
+        </a:xfrm>
+      </p:grpSpPr>
+      <p:sp>
+        <p:nvSpPr>
+          <p:cNvPr id="103" name="Rectangle 102">
+            <a:extLst>
+              <a:ext uri="{FF2B5EF4-FFF2-40B4-BE49-F238E27FC236}">
+                <a16:creationId xmlns:a16="http://schemas.microsoft.com/office/drawing/2014/main" id="{B4C6A0FF-F365-4B2E-9C89-35A586B908F0}"/>
+              </a:ext>
+            </a:extLst>
+          </p:cNvPr>
+          <p:cNvSpPr/>
+          <p:nvPr/>
+        </p:nvSpPr>
+        <p:spPr>
+          <a:xfrm>
+            <a:off x="1359605" y="846905"/>
+            <a:ext cx="3069520" cy="1193407"/>
+          </a:xfrm>
+          <a:prstGeom prst="rect">
+            <a:avLst/>
+          </a:prstGeom>
+          <a:noFill/>
+          <a:ln w="28575"/>
+        </p:spPr>
+        <p:style>
+          <a:lnRef idx="2">
+            <a:schemeClr val="accent6">
+              <a:shade val="50000"/>
+            </a:schemeClr>
+          </a:lnRef>
+          <a:fillRef idx="1">
+            <a:schemeClr val="accent6"/>
+          </a:fillRef>
+          <a:effectRef idx="0">
+            <a:schemeClr val="accent6"/>
+          </a:effectRef>
+          <a:fontRef idx="minor">
+            <a:schemeClr val="lt1"/>
+          </a:fontRef>
+        </p:style>
+        <p:txBody>
+          <a:bodyPr rtlCol="0" anchor="ctr"/>
+          <a:lstStyle/>
+          <a:p>
+            <a:pPr algn="ctr"/>
+            <a:endParaRPr lang="en-US" sz="1400" dirty="0">
+              <a:latin typeface="Segoe UI" panose="020B0502040204020203" pitchFamily="34" charset="0"/>
+              <a:cs typeface="Segoe UI" panose="020B0502040204020203" pitchFamily="34" charset="0"/>
+            </a:endParaRPr>
+          </a:p>
+        </p:txBody>
+      </p:sp>
+      <p:sp>
+        <p:nvSpPr>
+          <p:cNvPr id="2" name="Arrow: Pentagon 1">
+            <a:extLst>
+              <a:ext uri="{FF2B5EF4-FFF2-40B4-BE49-F238E27FC236}">
+                <a16:creationId xmlns:a16="http://schemas.microsoft.com/office/drawing/2014/main" id="{A92635DF-E2B3-48D5-8AD0-5E70BA150924}"/>
+              </a:ext>
+            </a:extLst>
+          </p:cNvPr>
+          <p:cNvSpPr/>
+          <p:nvPr/>
+        </p:nvSpPr>
+        <p:spPr>
+          <a:xfrm>
+            <a:off x="1235387" y="2848478"/>
+            <a:ext cx="825910" cy="688259"/>
+          </a:xfrm>
+          <a:prstGeom prst="homePlate">
+            <a:avLst>
+              <a:gd name="adj" fmla="val 35714"/>
+            </a:avLst>
+          </a:prstGeom>
+        </p:spPr>
+        <p:style>
+          <a:lnRef idx="2">
+            <a:schemeClr val="dk1"/>
+          </a:lnRef>
+          <a:fillRef idx="1">
+            <a:schemeClr val="lt1"/>
+          </a:fillRef>
+          <a:effectRef idx="0">
+            <a:schemeClr val="dk1"/>
+          </a:effectRef>
+          <a:fontRef idx="minor">
+            <a:schemeClr val="dk1"/>
+          </a:fontRef>
+        </p:style>
+        <p:txBody>
+          <a:bodyPr rtlCol="0" anchor="ctr"/>
+          <a:lstStyle/>
+          <a:p>
+            <a:pPr algn="ctr"/>
+            <a:endParaRPr lang="en-US" sz="1400" dirty="0">
+              <a:latin typeface="Segoe UI" panose="020B0502040204020203" pitchFamily="34" charset="0"/>
+              <a:cs typeface="Segoe UI" panose="020B0502040204020203" pitchFamily="34" charset="0"/>
+            </a:endParaRPr>
+          </a:p>
+        </p:txBody>
+      </p:sp>
+      <p:sp>
+        <p:nvSpPr>
+          <p:cNvPr id="5" name="Arrow: Pentagon 4">
+            <a:extLst>
+              <a:ext uri="{FF2B5EF4-FFF2-40B4-BE49-F238E27FC236}">
+                <a16:creationId xmlns:a16="http://schemas.microsoft.com/office/drawing/2014/main" id="{5323F636-8AC2-4ACE-9591-95A57A54F9E1}"/>
+              </a:ext>
+            </a:extLst>
+          </p:cNvPr>
+          <p:cNvSpPr/>
+          <p:nvPr/>
+        </p:nvSpPr>
+        <p:spPr>
+          <a:xfrm flipH="1">
+            <a:off x="4022994" y="2848478"/>
+            <a:ext cx="825910" cy="688259"/>
+          </a:xfrm>
+          <a:prstGeom prst="homePlate">
+            <a:avLst>
+              <a:gd name="adj" fmla="val 35714"/>
+            </a:avLst>
+          </a:prstGeom>
+        </p:spPr>
+        <p:style>
+          <a:lnRef idx="2">
+            <a:schemeClr val="dk1"/>
+          </a:lnRef>
+          <a:fillRef idx="1">
+            <a:schemeClr val="lt1"/>
+          </a:fillRef>
+          <a:effectRef idx="0">
+            <a:schemeClr val="dk1"/>
+          </a:effectRef>
+          <a:fontRef idx="minor">
+            <a:schemeClr val="dk1"/>
+          </a:fontRef>
+        </p:style>
+        <p:txBody>
+          <a:bodyPr rtlCol="0" anchor="ctr"/>
+          <a:lstStyle/>
+          <a:p>
+            <a:pPr algn="ctr"/>
+            <a:endParaRPr lang="en-US" sz="1400" dirty="0">
+              <a:latin typeface="Segoe UI" panose="020B0502040204020203" pitchFamily="34" charset="0"/>
+              <a:cs typeface="Segoe UI" panose="020B0502040204020203" pitchFamily="34" charset="0"/>
+            </a:endParaRPr>
+          </a:p>
+        </p:txBody>
+      </p:sp>
+      <p:grpSp>
+        <p:nvGrpSpPr>
+          <p:cNvPr id="23" name="Group 22">
+            <a:extLst>
+              <a:ext uri="{FF2B5EF4-FFF2-40B4-BE49-F238E27FC236}">
+                <a16:creationId xmlns:a16="http://schemas.microsoft.com/office/drawing/2014/main" id="{75E2BC8C-FF12-4CBC-94F2-35709612F722}"/>
+              </a:ext>
+            </a:extLst>
+          </p:cNvPr>
+          <p:cNvGrpSpPr/>
+          <p:nvPr/>
+        </p:nvGrpSpPr>
+        <p:grpSpPr>
+          <a:xfrm>
+            <a:off x="7023322" y="2848478"/>
+            <a:ext cx="688259" cy="688259"/>
+            <a:chOff x="10520519" y="1573161"/>
+            <a:chExt cx="688259" cy="688259"/>
+          </a:xfrm>
+        </p:grpSpPr>
+        <p:sp>
+          <p:nvSpPr>
+            <p:cNvPr id="3" name="Oval 2">
+              <a:extLst>
+                <a:ext uri="{FF2B5EF4-FFF2-40B4-BE49-F238E27FC236}">
+                  <a16:creationId xmlns:a16="http://schemas.microsoft.com/office/drawing/2014/main" id="{9DD347AF-5BBD-431D-92A3-EA7685F87094}"/>
+                </a:ext>
+              </a:extLst>
+            </p:cNvPr>
+            <p:cNvSpPr/>
+            <p:nvPr/>
+          </p:nvSpPr>
+          <p:spPr>
+            <a:xfrm>
+              <a:off x="10520519" y="1573161"/>
+              <a:ext cx="688259" cy="688259"/>
+            </a:xfrm>
+            <a:prstGeom prst="ellipse">
+              <a:avLst/>
+            </a:prstGeom>
+          </p:spPr>
+          <p:style>
+            <a:lnRef idx="2">
+              <a:schemeClr val="dk1"/>
+            </a:lnRef>
+            <a:fillRef idx="1">
+              <a:schemeClr val="lt1"/>
+            </a:fillRef>
+            <a:effectRef idx="0">
+              <a:schemeClr val="dk1"/>
+            </a:effectRef>
+            <a:fontRef idx="minor">
+              <a:schemeClr val="dk1"/>
+            </a:fontRef>
+          </p:style>
+          <p:txBody>
+            <a:bodyPr rtlCol="0" anchor="ctr"/>
+            <a:lstStyle/>
+            <a:p>
+              <a:pPr algn="ctr"/>
+              <a:endParaRPr lang="en-US"/>
+            </a:p>
+          </p:txBody>
+        </p:sp>
+        <p:cxnSp>
+          <p:nvCxnSpPr>
+            <p:cNvPr id="8" name="Straight Connector 7">
+              <a:extLst>
+                <a:ext uri="{FF2B5EF4-FFF2-40B4-BE49-F238E27FC236}">
+                  <a16:creationId xmlns:a16="http://schemas.microsoft.com/office/drawing/2014/main" id="{6D313B28-7465-47BE-8559-99ABB8B97A8C}"/>
+                </a:ext>
+              </a:extLst>
+            </p:cNvPr>
+            <p:cNvCxnSpPr>
+              <a:stCxn id="3" idx="1"/>
+              <a:endCxn id="3" idx="5"/>
+            </p:cNvCxnSpPr>
+            <p:nvPr/>
+          </p:nvCxnSpPr>
+          <p:spPr>
+            <a:xfrm>
+              <a:off x="10621312" y="1673954"/>
+              <a:ext cx="486673" cy="486673"/>
+            </a:xfrm>
+            <a:prstGeom prst="line">
+              <a:avLst/>
+            </a:prstGeom>
+          </p:spPr>
+          <p:style>
+            <a:lnRef idx="2">
+              <a:schemeClr val="dk1"/>
+            </a:lnRef>
+            <a:fillRef idx="1">
+              <a:schemeClr val="lt1"/>
+            </a:fillRef>
+            <a:effectRef idx="0">
+              <a:schemeClr val="dk1"/>
+            </a:effectRef>
+            <a:fontRef idx="minor">
+              <a:schemeClr val="dk1"/>
+            </a:fontRef>
+          </p:style>
+        </p:cxnSp>
+        <p:cxnSp>
+          <p:nvCxnSpPr>
+            <p:cNvPr id="10" name="Straight Connector 9">
+              <a:extLst>
+                <a:ext uri="{FF2B5EF4-FFF2-40B4-BE49-F238E27FC236}">
+                  <a16:creationId xmlns:a16="http://schemas.microsoft.com/office/drawing/2014/main" id="{A45CB16D-21ED-48AE-BD43-DD1F630146DE}"/>
+                </a:ext>
+              </a:extLst>
+            </p:cNvPr>
+            <p:cNvCxnSpPr>
+              <a:stCxn id="3" idx="3"/>
+              <a:endCxn id="3" idx="7"/>
+            </p:cNvCxnSpPr>
+            <p:nvPr/>
+          </p:nvCxnSpPr>
+          <p:spPr>
+            <a:xfrm flipV="1">
+              <a:off x="10621312" y="1673954"/>
+              <a:ext cx="486673" cy="486673"/>
+            </a:xfrm>
+            <a:prstGeom prst="line">
+              <a:avLst/>
+            </a:prstGeom>
+          </p:spPr>
+          <p:style>
+            <a:lnRef idx="2">
+              <a:schemeClr val="dk1"/>
+            </a:lnRef>
+            <a:fillRef idx="1">
+              <a:schemeClr val="lt1"/>
+            </a:fillRef>
+            <a:effectRef idx="0">
+              <a:schemeClr val="dk1"/>
+            </a:effectRef>
+            <a:fontRef idx="minor">
+              <a:schemeClr val="dk1"/>
+            </a:fontRef>
+          </p:style>
+        </p:cxnSp>
+      </p:grpSp>
+      <p:sp>
+        <p:nvSpPr>
+          <p:cNvPr id="11" name="Rectangle 10">
+            <a:extLst>
+              <a:ext uri="{FF2B5EF4-FFF2-40B4-BE49-F238E27FC236}">
+                <a16:creationId xmlns:a16="http://schemas.microsoft.com/office/drawing/2014/main" id="{E650B5D0-2BB0-4D62-BC80-3F2866B17DBB}"/>
+              </a:ext>
+            </a:extLst>
+          </p:cNvPr>
+          <p:cNvSpPr/>
+          <p:nvPr/>
+        </p:nvSpPr>
+        <p:spPr>
+          <a:xfrm>
+            <a:off x="2615101" y="3016861"/>
+            <a:ext cx="825910" cy="351492"/>
+          </a:xfrm>
+          <a:prstGeom prst="rect">
+            <a:avLst/>
+          </a:prstGeom>
+          <a:ln w="28575"/>
+        </p:spPr>
+        <p:style>
+          <a:lnRef idx="2">
+            <a:schemeClr val="accent6">
+              <a:shade val="50000"/>
+            </a:schemeClr>
+          </a:lnRef>
+          <a:fillRef idx="1">
+            <a:schemeClr val="accent6"/>
+          </a:fillRef>
+          <a:effectRef idx="0">
+            <a:schemeClr val="accent6"/>
+          </a:effectRef>
+          <a:fontRef idx="minor">
+            <a:schemeClr val="lt1"/>
+          </a:fontRef>
+        </p:style>
+        <p:txBody>
+          <a:bodyPr rtlCol="0" anchor="ctr"/>
+          <a:lstStyle/>
+          <a:p>
+            <a:pPr algn="ctr"/>
+            <a:endParaRPr lang="en-US" sz="1400" dirty="0">
+              <a:latin typeface="Segoe UI" panose="020B0502040204020203" pitchFamily="34" charset="0"/>
+              <a:cs typeface="Segoe UI" panose="020B0502040204020203" pitchFamily="34" charset="0"/>
+            </a:endParaRPr>
+          </a:p>
+        </p:txBody>
+      </p:sp>
+      <p:cxnSp>
+        <p:nvCxnSpPr>
+          <p:cNvPr id="13" name="Straight Connector 12">
+            <a:extLst>
+              <a:ext uri="{FF2B5EF4-FFF2-40B4-BE49-F238E27FC236}">
+                <a16:creationId xmlns:a16="http://schemas.microsoft.com/office/drawing/2014/main" id="{10B9C22E-85BC-48F4-B9E8-9D02616E8367}"/>
+              </a:ext>
+            </a:extLst>
+          </p:cNvPr>
+          <p:cNvCxnSpPr>
+            <a:cxnSpLocks/>
+            <a:stCxn id="2" idx="3"/>
+            <a:endCxn id="11" idx="1"/>
+          </p:cNvCxnSpPr>
+          <p:nvPr/>
+        </p:nvCxnSpPr>
+        <p:spPr>
+          <a:xfrm flipV="1">
+            <a:off x="2061297" y="3192607"/>
+            <a:ext cx="553804" cy="1"/>
+          </a:xfrm>
+          <a:prstGeom prst="line">
+            <a:avLst/>
+          </a:prstGeom>
+          <a:ln w="28575">
+            <a:headEnd type="none" w="med" len="med"/>
+            <a:tailEnd type="triangle" w="med" len="med"/>
+          </a:ln>
+        </p:spPr>
+        <p:style>
+          <a:lnRef idx="2">
+            <a:schemeClr val="accent6">
+              <a:shade val="50000"/>
+            </a:schemeClr>
+          </a:lnRef>
+          <a:fillRef idx="1">
+            <a:schemeClr val="accent6"/>
+          </a:fillRef>
+          <a:effectRef idx="0">
+            <a:schemeClr val="accent6"/>
+          </a:effectRef>
+          <a:fontRef idx="minor">
+            <a:schemeClr val="lt1"/>
+          </a:fontRef>
+        </p:style>
+      </p:cxnSp>
+      <p:cxnSp>
+        <p:nvCxnSpPr>
+          <p:cNvPr id="15" name="Straight Connector 14">
+            <a:extLst>
+              <a:ext uri="{FF2B5EF4-FFF2-40B4-BE49-F238E27FC236}">
+                <a16:creationId xmlns:a16="http://schemas.microsoft.com/office/drawing/2014/main" id="{472EC04D-2641-4701-952D-F1919E84CA05}"/>
+              </a:ext>
+            </a:extLst>
+          </p:cNvPr>
+          <p:cNvCxnSpPr>
+            <a:cxnSpLocks/>
+            <a:stCxn id="11" idx="3"/>
+            <a:endCxn id="5" idx="3"/>
+          </p:cNvCxnSpPr>
+          <p:nvPr/>
+        </p:nvCxnSpPr>
+        <p:spPr>
+          <a:xfrm>
+            <a:off x="3441011" y="3192607"/>
+            <a:ext cx="581983" cy="1"/>
+          </a:xfrm>
+          <a:prstGeom prst="line">
+            <a:avLst/>
+          </a:prstGeom>
+          <a:ln w="28575">
+            <a:headEnd type="none" w="med" len="med"/>
+            <a:tailEnd type="triangle" w="med" len="med"/>
+          </a:ln>
+        </p:spPr>
+        <p:style>
+          <a:lnRef idx="2">
+            <a:schemeClr val="accent6">
+              <a:shade val="50000"/>
+            </a:schemeClr>
+          </a:lnRef>
+          <a:fillRef idx="1">
+            <a:schemeClr val="accent6"/>
+          </a:fillRef>
+          <a:effectRef idx="0">
+            <a:schemeClr val="accent6"/>
+          </a:effectRef>
+          <a:fontRef idx="minor">
+            <a:schemeClr val="lt1"/>
+          </a:fontRef>
+        </p:style>
+      </p:cxnSp>
+      <p:grpSp>
+        <p:nvGrpSpPr>
+          <p:cNvPr id="22" name="Group 21">
+            <a:extLst>
+              <a:ext uri="{FF2B5EF4-FFF2-40B4-BE49-F238E27FC236}">
+                <a16:creationId xmlns:a16="http://schemas.microsoft.com/office/drawing/2014/main" id="{E0726662-7BE9-4F9D-BADE-02F681BE4ECD}"/>
+              </a:ext>
+            </a:extLst>
+          </p:cNvPr>
+          <p:cNvGrpSpPr/>
+          <p:nvPr/>
+        </p:nvGrpSpPr>
+        <p:grpSpPr>
+          <a:xfrm>
+            <a:off x="337453" y="2848478"/>
+            <a:ext cx="688259" cy="688259"/>
+            <a:chOff x="5780449" y="1570697"/>
+            <a:chExt cx="688259" cy="688259"/>
+          </a:xfrm>
+        </p:grpSpPr>
+        <p:sp>
+          <p:nvSpPr>
+            <p:cNvPr id="20" name="Oval 19">
+              <a:extLst>
+                <a:ext uri="{FF2B5EF4-FFF2-40B4-BE49-F238E27FC236}">
+                  <a16:creationId xmlns:a16="http://schemas.microsoft.com/office/drawing/2014/main" id="{93DB1817-E67B-4900-85DD-D4D47A66FC9D}"/>
+                </a:ext>
+              </a:extLst>
+            </p:cNvPr>
+            <p:cNvSpPr/>
+            <p:nvPr/>
+          </p:nvSpPr>
+          <p:spPr>
+            <a:xfrm>
+              <a:off x="5780449" y="1570697"/>
+              <a:ext cx="688259" cy="688259"/>
+            </a:xfrm>
+            <a:prstGeom prst="ellipse">
+              <a:avLst/>
+            </a:prstGeom>
+          </p:spPr>
+          <p:style>
+            <a:lnRef idx="2">
+              <a:schemeClr val="dk1"/>
+            </a:lnRef>
+            <a:fillRef idx="1">
+              <a:schemeClr val="lt1"/>
+            </a:fillRef>
+            <a:effectRef idx="0">
+              <a:schemeClr val="dk1"/>
+            </a:effectRef>
+            <a:fontRef idx="minor">
+              <a:schemeClr val="dk1"/>
+            </a:fontRef>
+          </p:style>
+          <p:txBody>
+            <a:bodyPr rtlCol="0" anchor="ctr"/>
+            <a:lstStyle/>
+            <a:p>
+              <a:pPr algn="ctr"/>
+              <a:endParaRPr lang="en-US" dirty="0"/>
+            </a:p>
+          </p:txBody>
+        </p:sp>
+        <p:sp>
+          <p:nvSpPr>
+            <p:cNvPr id="21" name="Freeform: Shape 20">
+              <a:extLst>
+                <a:ext uri="{FF2B5EF4-FFF2-40B4-BE49-F238E27FC236}">
+                  <a16:creationId xmlns:a16="http://schemas.microsoft.com/office/drawing/2014/main" id="{285376D4-50E0-4344-9776-09BF5A29B351}"/>
+                </a:ext>
+              </a:extLst>
+            </p:cNvPr>
+            <p:cNvSpPr/>
+            <p:nvPr/>
+          </p:nvSpPr>
+          <p:spPr>
+            <a:xfrm>
+              <a:off x="5843591" y="1739803"/>
+              <a:ext cx="561975" cy="350046"/>
+            </a:xfrm>
+            <a:custGeom>
+              <a:avLst/>
+              <a:gdLst>
+                <a:gd name="connsiteX0" fmla="*/ 0 w 561975"/>
+                <a:gd name="connsiteY0" fmla="*/ 179209 h 363517"/>
+                <a:gd name="connsiteX1" fmla="*/ 135731 w 561975"/>
+                <a:gd name="connsiteY1" fmla="*/ 5378 h 363517"/>
+                <a:gd name="connsiteX2" fmla="*/ 416718 w 561975"/>
+                <a:gd name="connsiteY2" fmla="*/ 360184 h 363517"/>
+                <a:gd name="connsiteX3" fmla="*/ 561975 w 561975"/>
+                <a:gd name="connsiteY3" fmla="*/ 153016 h 363517"/>
+                <a:gd name="connsiteX0" fmla="*/ 0 w 561975"/>
+                <a:gd name="connsiteY0" fmla="*/ 174648 h 358777"/>
+                <a:gd name="connsiteX1" fmla="*/ 176212 w 561975"/>
+                <a:gd name="connsiteY1" fmla="*/ 5579 h 358777"/>
+                <a:gd name="connsiteX2" fmla="*/ 416718 w 561975"/>
+                <a:gd name="connsiteY2" fmla="*/ 355623 h 358777"/>
+                <a:gd name="connsiteX3" fmla="*/ 561975 w 561975"/>
+                <a:gd name="connsiteY3" fmla="*/ 148455 h 358777"/>
+                <a:gd name="connsiteX0" fmla="*/ 0 w 561975"/>
+                <a:gd name="connsiteY0" fmla="*/ 169096 h 353225"/>
+                <a:gd name="connsiteX1" fmla="*/ 176212 w 561975"/>
+                <a:gd name="connsiteY1" fmla="*/ 27 h 353225"/>
+                <a:gd name="connsiteX2" fmla="*/ 416718 w 561975"/>
+                <a:gd name="connsiteY2" fmla="*/ 350071 h 353225"/>
+                <a:gd name="connsiteX3" fmla="*/ 561975 w 561975"/>
+                <a:gd name="connsiteY3" fmla="*/ 142903 h 353225"/>
+                <a:gd name="connsiteX0" fmla="*/ 0 w 561975"/>
+                <a:gd name="connsiteY0" fmla="*/ 169096 h 350071"/>
+                <a:gd name="connsiteX1" fmla="*/ 176212 w 561975"/>
+                <a:gd name="connsiteY1" fmla="*/ 27 h 350071"/>
+                <a:gd name="connsiteX2" fmla="*/ 416718 w 561975"/>
+                <a:gd name="connsiteY2" fmla="*/ 350071 h 350071"/>
+                <a:gd name="connsiteX3" fmla="*/ 561975 w 561975"/>
+                <a:gd name="connsiteY3" fmla="*/ 142903 h 350071"/>
+                <a:gd name="connsiteX0" fmla="*/ 0 w 561975"/>
+                <a:gd name="connsiteY0" fmla="*/ 169096 h 353225"/>
+                <a:gd name="connsiteX1" fmla="*/ 145256 w 561975"/>
+                <a:gd name="connsiteY1" fmla="*/ 27 h 353225"/>
+                <a:gd name="connsiteX2" fmla="*/ 416718 w 561975"/>
+                <a:gd name="connsiteY2" fmla="*/ 350071 h 353225"/>
+                <a:gd name="connsiteX3" fmla="*/ 561975 w 561975"/>
+                <a:gd name="connsiteY3" fmla="*/ 142903 h 353225"/>
+                <a:gd name="connsiteX0" fmla="*/ 0 w 561975"/>
+                <a:gd name="connsiteY0" fmla="*/ 169096 h 350115"/>
+                <a:gd name="connsiteX1" fmla="*/ 145256 w 561975"/>
+                <a:gd name="connsiteY1" fmla="*/ 27 h 350115"/>
+                <a:gd name="connsiteX2" fmla="*/ 416718 w 561975"/>
+                <a:gd name="connsiteY2" fmla="*/ 350071 h 350115"/>
+                <a:gd name="connsiteX3" fmla="*/ 561975 w 561975"/>
+                <a:gd name="connsiteY3" fmla="*/ 142903 h 350115"/>
+                <a:gd name="connsiteX0" fmla="*/ 0 w 561975"/>
+                <a:gd name="connsiteY0" fmla="*/ 169071 h 350090"/>
+                <a:gd name="connsiteX1" fmla="*/ 145256 w 561975"/>
+                <a:gd name="connsiteY1" fmla="*/ 2 h 350090"/>
+                <a:gd name="connsiteX2" fmla="*/ 416718 w 561975"/>
+                <a:gd name="connsiteY2" fmla="*/ 350046 h 350090"/>
+                <a:gd name="connsiteX3" fmla="*/ 561975 w 561975"/>
+                <a:gd name="connsiteY3" fmla="*/ 142878 h 350090"/>
+                <a:gd name="connsiteX0" fmla="*/ 0 w 561975"/>
+                <a:gd name="connsiteY0" fmla="*/ 169071 h 350046"/>
+                <a:gd name="connsiteX1" fmla="*/ 145256 w 561975"/>
+                <a:gd name="connsiteY1" fmla="*/ 2 h 350046"/>
+                <a:gd name="connsiteX2" fmla="*/ 416718 w 561975"/>
+                <a:gd name="connsiteY2" fmla="*/ 350046 h 350046"/>
+                <a:gd name="connsiteX3" fmla="*/ 561975 w 561975"/>
+                <a:gd name="connsiteY3" fmla="*/ 142878 h 350046"/>
+              </a:gdLst>
+              <a:ahLst/>
+              <a:cxnLst>
+                <a:cxn ang="0">
+                  <a:pos x="connsiteX0" y="connsiteY0"/>
+                </a:cxn>
+                <a:cxn ang="0">
+                  <a:pos x="connsiteX1" y="connsiteY1"/>
+                </a:cxn>
+                <a:cxn ang="0">
+                  <a:pos x="connsiteX2" y="connsiteY2"/>
+                </a:cxn>
+                <a:cxn ang="0">
+                  <a:pos x="connsiteX3" y="connsiteY3"/>
+                </a:cxn>
+              </a:cxnLst>
+              <a:rect l="l" t="t" r="r" b="b"/>
+              <a:pathLst>
+                <a:path w="561975" h="350046">
+                  <a:moveTo>
+                    <a:pt x="0" y="169071"/>
+                  </a:moveTo>
+                  <a:cubicBezTo>
+                    <a:pt x="33139" y="67074"/>
+                    <a:pt x="66278" y="796"/>
+                    <a:pt x="145256" y="2"/>
+                  </a:cubicBezTo>
+                  <a:cubicBezTo>
+                    <a:pt x="224234" y="-792"/>
+                    <a:pt x="335359" y="350046"/>
+                    <a:pt x="416718" y="350046"/>
+                  </a:cubicBezTo>
+                  <a:cubicBezTo>
+                    <a:pt x="498077" y="350046"/>
+                    <a:pt x="524867" y="258765"/>
+                    <a:pt x="561975" y="142878"/>
+                  </a:cubicBezTo>
+                </a:path>
+              </a:pathLst>
+            </a:custGeom>
+          </p:spPr>
+          <p:style>
+            <a:lnRef idx="2">
+              <a:schemeClr val="dk1"/>
+            </a:lnRef>
+            <a:fillRef idx="1">
+              <a:schemeClr val="lt1"/>
+            </a:fillRef>
+            <a:effectRef idx="0">
+              <a:schemeClr val="dk1"/>
+            </a:effectRef>
+            <a:fontRef idx="minor">
+              <a:schemeClr val="dk1"/>
+            </a:fontRef>
+          </p:style>
+          <p:txBody>
+            <a:bodyPr rtlCol="0" anchor="ctr"/>
+            <a:lstStyle/>
+            <a:p>
+              <a:pPr algn="ctr"/>
+              <a:endParaRPr lang="en-US"/>
+            </a:p>
+          </p:txBody>
+        </p:sp>
+      </p:grpSp>
+      <p:grpSp>
+        <p:nvGrpSpPr>
+          <p:cNvPr id="24" name="Group 23">
+            <a:extLst>
+              <a:ext uri="{FF2B5EF4-FFF2-40B4-BE49-F238E27FC236}">
+                <a16:creationId xmlns:a16="http://schemas.microsoft.com/office/drawing/2014/main" id="{40A9AB12-CD28-4660-95DF-E743F6C0389D}"/>
+              </a:ext>
+            </a:extLst>
+          </p:cNvPr>
+          <p:cNvGrpSpPr/>
+          <p:nvPr/>
+        </p:nvGrpSpPr>
+        <p:grpSpPr>
+          <a:xfrm>
+            <a:off x="7023322" y="3873647"/>
+            <a:ext cx="688259" cy="688259"/>
+            <a:chOff x="5780449" y="1570697"/>
+            <a:chExt cx="688259" cy="688259"/>
+          </a:xfrm>
+        </p:grpSpPr>
+        <p:sp>
+          <p:nvSpPr>
+            <p:cNvPr id="25" name="Oval 24">
+              <a:extLst>
+                <a:ext uri="{FF2B5EF4-FFF2-40B4-BE49-F238E27FC236}">
+                  <a16:creationId xmlns:a16="http://schemas.microsoft.com/office/drawing/2014/main" id="{E44DE030-87AD-4604-99DB-2BE0C3310C6C}"/>
+                </a:ext>
+              </a:extLst>
+            </p:cNvPr>
+            <p:cNvSpPr/>
+            <p:nvPr/>
+          </p:nvSpPr>
+          <p:spPr>
+            <a:xfrm>
+              <a:off x="5780449" y="1570697"/>
+              <a:ext cx="688259" cy="688259"/>
+            </a:xfrm>
+            <a:prstGeom prst="ellipse">
+              <a:avLst/>
+            </a:prstGeom>
+          </p:spPr>
+          <p:style>
+            <a:lnRef idx="2">
+              <a:schemeClr val="dk1"/>
+            </a:lnRef>
+            <a:fillRef idx="1">
+              <a:schemeClr val="lt1"/>
+            </a:fillRef>
+            <a:effectRef idx="0">
+              <a:schemeClr val="dk1"/>
+            </a:effectRef>
+            <a:fontRef idx="minor">
+              <a:schemeClr val="dk1"/>
+            </a:fontRef>
+          </p:style>
+          <p:txBody>
+            <a:bodyPr rtlCol="0" anchor="ctr"/>
+            <a:lstStyle/>
+            <a:p>
+              <a:pPr algn="ctr"/>
+              <a:endParaRPr lang="en-US" dirty="0"/>
+            </a:p>
+          </p:txBody>
+        </p:sp>
+        <p:sp>
+          <p:nvSpPr>
+            <p:cNvPr id="26" name="Freeform: Shape 25">
+              <a:extLst>
+                <a:ext uri="{FF2B5EF4-FFF2-40B4-BE49-F238E27FC236}">
+                  <a16:creationId xmlns:a16="http://schemas.microsoft.com/office/drawing/2014/main" id="{21BDB95C-680B-4A2D-A28A-35C072FFE788}"/>
+                </a:ext>
+              </a:extLst>
+            </p:cNvPr>
+            <p:cNvSpPr/>
+            <p:nvPr/>
+          </p:nvSpPr>
+          <p:spPr>
+            <a:xfrm>
+              <a:off x="5843591" y="1739803"/>
+              <a:ext cx="561975" cy="350046"/>
+            </a:xfrm>
+            <a:custGeom>
+              <a:avLst/>
+              <a:gdLst>
+                <a:gd name="connsiteX0" fmla="*/ 0 w 561975"/>
+                <a:gd name="connsiteY0" fmla="*/ 179209 h 363517"/>
+                <a:gd name="connsiteX1" fmla="*/ 135731 w 561975"/>
+                <a:gd name="connsiteY1" fmla="*/ 5378 h 363517"/>
+                <a:gd name="connsiteX2" fmla="*/ 416718 w 561975"/>
+                <a:gd name="connsiteY2" fmla="*/ 360184 h 363517"/>
+                <a:gd name="connsiteX3" fmla="*/ 561975 w 561975"/>
+                <a:gd name="connsiteY3" fmla="*/ 153016 h 363517"/>
+                <a:gd name="connsiteX0" fmla="*/ 0 w 561975"/>
+                <a:gd name="connsiteY0" fmla="*/ 174648 h 358777"/>
+                <a:gd name="connsiteX1" fmla="*/ 176212 w 561975"/>
+                <a:gd name="connsiteY1" fmla="*/ 5579 h 358777"/>
+                <a:gd name="connsiteX2" fmla="*/ 416718 w 561975"/>
+                <a:gd name="connsiteY2" fmla="*/ 355623 h 358777"/>
+                <a:gd name="connsiteX3" fmla="*/ 561975 w 561975"/>
+                <a:gd name="connsiteY3" fmla="*/ 148455 h 358777"/>
+                <a:gd name="connsiteX0" fmla="*/ 0 w 561975"/>
+                <a:gd name="connsiteY0" fmla="*/ 169096 h 353225"/>
+                <a:gd name="connsiteX1" fmla="*/ 176212 w 561975"/>
+                <a:gd name="connsiteY1" fmla="*/ 27 h 353225"/>
+                <a:gd name="connsiteX2" fmla="*/ 416718 w 561975"/>
+                <a:gd name="connsiteY2" fmla="*/ 350071 h 353225"/>
+                <a:gd name="connsiteX3" fmla="*/ 561975 w 561975"/>
+                <a:gd name="connsiteY3" fmla="*/ 142903 h 353225"/>
+                <a:gd name="connsiteX0" fmla="*/ 0 w 561975"/>
+                <a:gd name="connsiteY0" fmla="*/ 169096 h 350071"/>
+                <a:gd name="connsiteX1" fmla="*/ 176212 w 561975"/>
+                <a:gd name="connsiteY1" fmla="*/ 27 h 350071"/>
+                <a:gd name="connsiteX2" fmla="*/ 416718 w 561975"/>
+                <a:gd name="connsiteY2" fmla="*/ 350071 h 350071"/>
+                <a:gd name="connsiteX3" fmla="*/ 561975 w 561975"/>
+                <a:gd name="connsiteY3" fmla="*/ 142903 h 350071"/>
+                <a:gd name="connsiteX0" fmla="*/ 0 w 561975"/>
+                <a:gd name="connsiteY0" fmla="*/ 169096 h 353225"/>
+                <a:gd name="connsiteX1" fmla="*/ 145256 w 561975"/>
+                <a:gd name="connsiteY1" fmla="*/ 27 h 353225"/>
+                <a:gd name="connsiteX2" fmla="*/ 416718 w 561975"/>
+                <a:gd name="connsiteY2" fmla="*/ 350071 h 353225"/>
+                <a:gd name="connsiteX3" fmla="*/ 561975 w 561975"/>
+                <a:gd name="connsiteY3" fmla="*/ 142903 h 353225"/>
+                <a:gd name="connsiteX0" fmla="*/ 0 w 561975"/>
+                <a:gd name="connsiteY0" fmla="*/ 169096 h 350115"/>
+                <a:gd name="connsiteX1" fmla="*/ 145256 w 561975"/>
+                <a:gd name="connsiteY1" fmla="*/ 27 h 350115"/>
+                <a:gd name="connsiteX2" fmla="*/ 416718 w 561975"/>
+                <a:gd name="connsiteY2" fmla="*/ 350071 h 350115"/>
+                <a:gd name="connsiteX3" fmla="*/ 561975 w 561975"/>
+                <a:gd name="connsiteY3" fmla="*/ 142903 h 350115"/>
+                <a:gd name="connsiteX0" fmla="*/ 0 w 561975"/>
+                <a:gd name="connsiteY0" fmla="*/ 169071 h 350090"/>
+                <a:gd name="connsiteX1" fmla="*/ 145256 w 561975"/>
+                <a:gd name="connsiteY1" fmla="*/ 2 h 350090"/>
+                <a:gd name="connsiteX2" fmla="*/ 416718 w 561975"/>
+                <a:gd name="connsiteY2" fmla="*/ 350046 h 350090"/>
+                <a:gd name="connsiteX3" fmla="*/ 561975 w 561975"/>
+                <a:gd name="connsiteY3" fmla="*/ 142878 h 350090"/>
+                <a:gd name="connsiteX0" fmla="*/ 0 w 561975"/>
+                <a:gd name="connsiteY0" fmla="*/ 169071 h 350046"/>
+                <a:gd name="connsiteX1" fmla="*/ 145256 w 561975"/>
+                <a:gd name="connsiteY1" fmla="*/ 2 h 350046"/>
+                <a:gd name="connsiteX2" fmla="*/ 416718 w 561975"/>
+                <a:gd name="connsiteY2" fmla="*/ 350046 h 350046"/>
+                <a:gd name="connsiteX3" fmla="*/ 561975 w 561975"/>
+                <a:gd name="connsiteY3" fmla="*/ 142878 h 350046"/>
+              </a:gdLst>
+              <a:ahLst/>
+              <a:cxnLst>
+                <a:cxn ang="0">
+                  <a:pos x="connsiteX0" y="connsiteY0"/>
+                </a:cxn>
+                <a:cxn ang="0">
+                  <a:pos x="connsiteX1" y="connsiteY1"/>
+                </a:cxn>
+                <a:cxn ang="0">
+                  <a:pos x="connsiteX2" y="connsiteY2"/>
+                </a:cxn>
+                <a:cxn ang="0">
+                  <a:pos x="connsiteX3" y="connsiteY3"/>
+                </a:cxn>
+              </a:cxnLst>
+              <a:rect l="l" t="t" r="r" b="b"/>
+              <a:pathLst>
+                <a:path w="561975" h="350046">
+                  <a:moveTo>
+                    <a:pt x="0" y="169071"/>
+                  </a:moveTo>
+                  <a:cubicBezTo>
+                    <a:pt x="33139" y="67074"/>
+                    <a:pt x="66278" y="796"/>
+                    <a:pt x="145256" y="2"/>
+                  </a:cubicBezTo>
+                  <a:cubicBezTo>
+                    <a:pt x="224234" y="-792"/>
+                    <a:pt x="335359" y="350046"/>
+                    <a:pt x="416718" y="350046"/>
+                  </a:cubicBezTo>
+                  <a:cubicBezTo>
+                    <a:pt x="498077" y="350046"/>
+                    <a:pt x="524867" y="258765"/>
+                    <a:pt x="561975" y="142878"/>
+                  </a:cubicBezTo>
+                </a:path>
+              </a:pathLst>
+            </a:custGeom>
+          </p:spPr>
+          <p:style>
+            <a:lnRef idx="2">
+              <a:schemeClr val="dk1"/>
+            </a:lnRef>
+            <a:fillRef idx="1">
+              <a:schemeClr val="lt1"/>
+            </a:fillRef>
+            <a:effectRef idx="0">
+              <a:schemeClr val="dk1"/>
+            </a:effectRef>
+            <a:fontRef idx="minor">
+              <a:schemeClr val="dk1"/>
+            </a:fontRef>
+          </p:style>
+          <p:txBody>
+            <a:bodyPr rtlCol="0" anchor="ctr"/>
+            <a:lstStyle/>
+            <a:p>
+              <a:pPr algn="ctr"/>
+              <a:endParaRPr lang="en-US"/>
+            </a:p>
+          </p:txBody>
+        </p:sp>
+      </p:grpSp>
+      <p:grpSp>
+        <p:nvGrpSpPr>
+          <p:cNvPr id="30" name="Group 29">
+            <a:extLst>
+              <a:ext uri="{FF2B5EF4-FFF2-40B4-BE49-F238E27FC236}">
+                <a16:creationId xmlns:a16="http://schemas.microsoft.com/office/drawing/2014/main" id="{36CB5C8E-CAA9-4384-ACF2-D4E6E12EC82E}"/>
+              </a:ext>
+            </a:extLst>
+          </p:cNvPr>
+          <p:cNvGrpSpPr/>
+          <p:nvPr/>
+        </p:nvGrpSpPr>
+        <p:grpSpPr>
+          <a:xfrm>
+            <a:off x="7843646" y="2848478"/>
+            <a:ext cx="804694" cy="688259"/>
+            <a:chOff x="6558894" y="2394153"/>
+            <a:chExt cx="804694" cy="688259"/>
+          </a:xfrm>
+        </p:grpSpPr>
+        <p:sp>
+          <p:nvSpPr>
+            <p:cNvPr id="31" name="Rectangle 30">
+              <a:extLst>
+                <a:ext uri="{FF2B5EF4-FFF2-40B4-BE49-F238E27FC236}">
+                  <a16:creationId xmlns:a16="http://schemas.microsoft.com/office/drawing/2014/main" id="{6445A10E-817A-4C85-B2F1-89BBF1D5267B}"/>
+                </a:ext>
+              </a:extLst>
+            </p:cNvPr>
+            <p:cNvSpPr/>
+            <p:nvPr/>
+          </p:nvSpPr>
+          <p:spPr>
+            <a:xfrm>
+              <a:off x="6558894" y="2394153"/>
+              <a:ext cx="804694" cy="688259"/>
+            </a:xfrm>
+            <a:prstGeom prst="rect">
+              <a:avLst/>
+            </a:prstGeom>
+          </p:spPr>
+          <p:style>
+            <a:lnRef idx="2">
+              <a:schemeClr val="dk1"/>
+            </a:lnRef>
+            <a:fillRef idx="1">
+              <a:schemeClr val="lt1"/>
+            </a:fillRef>
+            <a:effectRef idx="0">
+              <a:schemeClr val="dk1"/>
+            </a:effectRef>
+            <a:fontRef idx="minor">
+              <a:schemeClr val="dk1"/>
+            </a:fontRef>
+          </p:style>
+          <p:txBody>
+            <a:bodyPr rtlCol="0" anchor="ctr"/>
+            <a:lstStyle/>
+            <a:p>
+              <a:pPr algn="ctr"/>
+              <a:endParaRPr lang="en-US"/>
+            </a:p>
+          </p:txBody>
+        </p:sp>
+        <p:sp>
+          <p:nvSpPr>
+            <p:cNvPr id="32" name="Freeform: Shape 31">
+              <a:extLst>
+                <a:ext uri="{FF2B5EF4-FFF2-40B4-BE49-F238E27FC236}">
+                  <a16:creationId xmlns:a16="http://schemas.microsoft.com/office/drawing/2014/main" id="{0BD3B22C-FF51-400E-9EE6-2F552FFC94AF}"/>
+                </a:ext>
+              </a:extLst>
+            </p:cNvPr>
+            <p:cNvSpPr/>
+            <p:nvPr/>
+          </p:nvSpPr>
+          <p:spPr>
+            <a:xfrm>
+              <a:off x="6659616" y="2524547"/>
+              <a:ext cx="603250" cy="427471"/>
+            </a:xfrm>
+            <a:custGeom>
+              <a:avLst/>
+              <a:gdLst>
+                <a:gd name="connsiteX0" fmla="*/ 0 w 603250"/>
+                <a:gd name="connsiteY0" fmla="*/ 36107 h 461557"/>
+                <a:gd name="connsiteX1" fmla="*/ 374650 w 603250"/>
+                <a:gd name="connsiteY1" fmla="*/ 42457 h 461557"/>
+                <a:gd name="connsiteX2" fmla="*/ 603250 w 603250"/>
+                <a:gd name="connsiteY2" fmla="*/ 461557 h 461557"/>
+                <a:gd name="connsiteX0" fmla="*/ 0 w 603250"/>
+                <a:gd name="connsiteY0" fmla="*/ 7090 h 432540"/>
+                <a:gd name="connsiteX1" fmla="*/ 422275 w 603250"/>
+                <a:gd name="connsiteY1" fmla="*/ 130121 h 432540"/>
+                <a:gd name="connsiteX2" fmla="*/ 603250 w 603250"/>
+                <a:gd name="connsiteY2" fmla="*/ 432540 h 432540"/>
+                <a:gd name="connsiteX0" fmla="*/ 0 w 603250"/>
+                <a:gd name="connsiteY0" fmla="*/ 0 h 425450"/>
+                <a:gd name="connsiteX1" fmla="*/ 422275 w 603250"/>
+                <a:gd name="connsiteY1" fmla="*/ 123031 h 425450"/>
+                <a:gd name="connsiteX2" fmla="*/ 603250 w 603250"/>
+                <a:gd name="connsiteY2" fmla="*/ 425450 h 425450"/>
+                <a:gd name="connsiteX0" fmla="*/ 0 w 603250"/>
+                <a:gd name="connsiteY0" fmla="*/ 0 h 425450"/>
+                <a:gd name="connsiteX1" fmla="*/ 453231 w 603250"/>
+                <a:gd name="connsiteY1" fmla="*/ 106362 h 425450"/>
+                <a:gd name="connsiteX2" fmla="*/ 603250 w 603250"/>
+                <a:gd name="connsiteY2" fmla="*/ 425450 h 425450"/>
+                <a:gd name="connsiteX0" fmla="*/ 0 w 603250"/>
+                <a:gd name="connsiteY0" fmla="*/ 0 h 425450"/>
+                <a:gd name="connsiteX1" fmla="*/ 453231 w 603250"/>
+                <a:gd name="connsiteY1" fmla="*/ 106362 h 425450"/>
+                <a:gd name="connsiteX2" fmla="*/ 603250 w 603250"/>
+                <a:gd name="connsiteY2" fmla="*/ 425450 h 425450"/>
+                <a:gd name="connsiteX0" fmla="*/ 0 w 603250"/>
+                <a:gd name="connsiteY0" fmla="*/ 0 h 425450"/>
+                <a:gd name="connsiteX1" fmla="*/ 419894 w 603250"/>
+                <a:gd name="connsiteY1" fmla="*/ 58737 h 425450"/>
+                <a:gd name="connsiteX2" fmla="*/ 603250 w 603250"/>
+                <a:gd name="connsiteY2" fmla="*/ 425450 h 425450"/>
+                <a:gd name="connsiteX0" fmla="*/ 0 w 603250"/>
+                <a:gd name="connsiteY0" fmla="*/ 0 h 425450"/>
+                <a:gd name="connsiteX1" fmla="*/ 419894 w 603250"/>
+                <a:gd name="connsiteY1" fmla="*/ 58737 h 425450"/>
+                <a:gd name="connsiteX2" fmla="*/ 603250 w 603250"/>
+                <a:gd name="connsiteY2" fmla="*/ 425450 h 425450"/>
+                <a:gd name="connsiteX0" fmla="*/ 0 w 603250"/>
+                <a:gd name="connsiteY0" fmla="*/ 2021 h 427471"/>
+                <a:gd name="connsiteX1" fmla="*/ 419894 w 603250"/>
+                <a:gd name="connsiteY1" fmla="*/ 60758 h 427471"/>
+                <a:gd name="connsiteX2" fmla="*/ 603250 w 603250"/>
+                <a:gd name="connsiteY2" fmla="*/ 427471 h 427471"/>
+                <a:gd name="connsiteX0" fmla="*/ 0 w 603250"/>
+                <a:gd name="connsiteY0" fmla="*/ 2021 h 427471"/>
+                <a:gd name="connsiteX1" fmla="*/ 419894 w 603250"/>
+                <a:gd name="connsiteY1" fmla="*/ 60758 h 427471"/>
+                <a:gd name="connsiteX2" fmla="*/ 603250 w 603250"/>
+                <a:gd name="connsiteY2" fmla="*/ 427471 h 427471"/>
+              </a:gdLst>
+              <a:ahLst/>
+              <a:cxnLst>
+                <a:cxn ang="0">
+                  <a:pos x="connsiteX0" y="connsiteY0"/>
+                </a:cxn>
+                <a:cxn ang="0">
+                  <a:pos x="connsiteX1" y="connsiteY1"/>
+                </a:cxn>
+                <a:cxn ang="0">
+                  <a:pos x="connsiteX2" y="connsiteY2"/>
+                </a:cxn>
+              </a:cxnLst>
+              <a:rect l="l" t="t" r="r" b="b"/>
+              <a:pathLst>
+                <a:path w="603250" h="427471">
+                  <a:moveTo>
+                    <a:pt x="0" y="2021"/>
+                  </a:moveTo>
+                  <a:cubicBezTo>
+                    <a:pt x="244210" y="-1683"/>
+                    <a:pt x="314590" y="-7769"/>
+                    <a:pt x="419894" y="60758"/>
+                  </a:cubicBezTo>
+                  <a:cubicBezTo>
+                    <a:pt x="525198" y="129285"/>
+                    <a:pt x="543984" y="250994"/>
+                    <a:pt x="603250" y="427471"/>
+                  </a:cubicBezTo>
+                </a:path>
+              </a:pathLst>
+            </a:custGeom>
+          </p:spPr>
+          <p:style>
+            <a:lnRef idx="2">
+              <a:schemeClr val="dk1"/>
+            </a:lnRef>
+            <a:fillRef idx="1">
+              <a:schemeClr val="lt1"/>
+            </a:fillRef>
+            <a:effectRef idx="0">
+              <a:schemeClr val="dk1"/>
+            </a:effectRef>
+            <a:fontRef idx="minor">
+              <a:schemeClr val="dk1"/>
+            </a:fontRef>
+          </p:style>
+          <p:txBody>
+            <a:bodyPr rtlCol="0" anchor="ctr"/>
+            <a:lstStyle/>
+            <a:p>
+              <a:pPr algn="ctr"/>
+              <a:endParaRPr lang="en-US" dirty="0"/>
+            </a:p>
+          </p:txBody>
+        </p:sp>
+      </p:grpSp>
+      <p:cxnSp>
+        <p:nvCxnSpPr>
+          <p:cNvPr id="44" name="Straight Connector 43">
+            <a:extLst>
+              <a:ext uri="{FF2B5EF4-FFF2-40B4-BE49-F238E27FC236}">
+                <a16:creationId xmlns:a16="http://schemas.microsoft.com/office/drawing/2014/main" id="{EDA5A559-349A-40D3-8FB5-D1AAB176FA87}"/>
+              </a:ext>
+            </a:extLst>
+          </p:cNvPr>
+          <p:cNvCxnSpPr>
+            <a:cxnSpLocks/>
+            <a:stCxn id="5" idx="1"/>
+            <a:endCxn id="27" idx="1"/>
+          </p:cNvCxnSpPr>
+          <p:nvPr/>
+        </p:nvCxnSpPr>
+        <p:spPr>
+          <a:xfrm>
+            <a:off x="4848904" y="3192608"/>
+            <a:ext cx="132062" cy="0"/>
+          </a:xfrm>
+          <a:prstGeom prst="line">
+            <a:avLst/>
+          </a:prstGeom>
+          <a:ln>
+            <a:headEnd type="none" w="med" len="med"/>
+            <a:tailEnd type="triangle" w="med" len="med"/>
+          </a:ln>
+        </p:spPr>
+        <p:style>
+          <a:lnRef idx="2">
+            <a:schemeClr val="dk1"/>
+          </a:lnRef>
+          <a:fillRef idx="0">
+            <a:schemeClr val="dk1"/>
+          </a:fillRef>
+          <a:effectRef idx="1">
+            <a:schemeClr val="dk1"/>
+          </a:effectRef>
+          <a:fontRef idx="minor">
+            <a:schemeClr val="tx1"/>
+          </a:fontRef>
+        </p:style>
+      </p:cxnSp>
+      <p:cxnSp>
+        <p:nvCxnSpPr>
+          <p:cNvPr id="46" name="Straight Connector 45">
+            <a:extLst>
+              <a:ext uri="{FF2B5EF4-FFF2-40B4-BE49-F238E27FC236}">
+                <a16:creationId xmlns:a16="http://schemas.microsoft.com/office/drawing/2014/main" id="{AE7BA8DF-8C08-4D1A-9CFE-770B8DEA8B88}"/>
+              </a:ext>
+            </a:extLst>
+          </p:cNvPr>
+          <p:cNvCxnSpPr>
+            <a:cxnSpLocks/>
+            <a:stCxn id="27" idx="3"/>
+            <a:endCxn id="82" idx="1"/>
+          </p:cNvCxnSpPr>
+          <p:nvPr/>
+        </p:nvCxnSpPr>
+        <p:spPr>
+          <a:xfrm>
+            <a:off x="5785660" y="3192608"/>
+            <a:ext cx="199031" cy="0"/>
+          </a:xfrm>
+          <a:prstGeom prst="line">
+            <a:avLst/>
+          </a:prstGeom>
+          <a:ln>
+            <a:headEnd type="none" w="med" len="med"/>
+            <a:tailEnd type="triangle" w="med" len="med"/>
+          </a:ln>
+        </p:spPr>
+        <p:style>
+          <a:lnRef idx="2">
+            <a:schemeClr val="dk1"/>
+          </a:lnRef>
+          <a:fillRef idx="0">
+            <a:schemeClr val="dk1"/>
+          </a:fillRef>
+          <a:effectRef idx="1">
+            <a:schemeClr val="dk1"/>
+          </a:effectRef>
+          <a:fontRef idx="minor">
+            <a:schemeClr val="tx1"/>
+          </a:fontRef>
+        </p:style>
+      </p:cxnSp>
+      <p:cxnSp>
+        <p:nvCxnSpPr>
+          <p:cNvPr id="48" name="Straight Connector 47">
+            <a:extLst>
+              <a:ext uri="{FF2B5EF4-FFF2-40B4-BE49-F238E27FC236}">
+                <a16:creationId xmlns:a16="http://schemas.microsoft.com/office/drawing/2014/main" id="{68D2A545-005A-4315-A94E-3B55B77558F3}"/>
+              </a:ext>
+            </a:extLst>
+          </p:cNvPr>
+          <p:cNvCxnSpPr>
+            <a:cxnSpLocks/>
+            <a:stCxn id="3" idx="6"/>
+            <a:endCxn id="31" idx="1"/>
+          </p:cNvCxnSpPr>
+          <p:nvPr/>
+        </p:nvCxnSpPr>
+        <p:spPr>
+          <a:xfrm>
+            <a:off x="7711581" y="3192608"/>
+            <a:ext cx="132065" cy="0"/>
+          </a:xfrm>
+          <a:prstGeom prst="line">
+            <a:avLst/>
+          </a:prstGeom>
+          <a:ln>
+            <a:headEnd type="none" w="med" len="med"/>
+            <a:tailEnd type="triangle" w="med" len="med"/>
+          </a:ln>
+        </p:spPr>
+        <p:style>
+          <a:lnRef idx="2">
+            <a:schemeClr val="dk1"/>
+          </a:lnRef>
+          <a:fillRef idx="0">
+            <a:schemeClr val="dk1"/>
+          </a:fillRef>
+          <a:effectRef idx="1">
+            <a:schemeClr val="dk1"/>
+          </a:effectRef>
+          <a:fontRef idx="minor">
+            <a:schemeClr val="tx1"/>
+          </a:fontRef>
+        </p:style>
+      </p:cxnSp>
+      <p:cxnSp>
+        <p:nvCxnSpPr>
+          <p:cNvPr id="51" name="Straight Connector 50">
+            <a:extLst>
+              <a:ext uri="{FF2B5EF4-FFF2-40B4-BE49-F238E27FC236}">
+                <a16:creationId xmlns:a16="http://schemas.microsoft.com/office/drawing/2014/main" id="{4FDABD44-75CE-4A37-918C-F0894DD5D3BF}"/>
+              </a:ext>
+            </a:extLst>
+          </p:cNvPr>
+          <p:cNvCxnSpPr>
+            <a:cxnSpLocks/>
+            <a:stCxn id="20" idx="6"/>
+            <a:endCxn id="2" idx="1"/>
+          </p:cNvCxnSpPr>
+          <p:nvPr/>
+        </p:nvCxnSpPr>
+        <p:spPr>
+          <a:xfrm>
+            <a:off x="1025712" y="3192608"/>
+            <a:ext cx="209675" cy="0"/>
+          </a:xfrm>
+          <a:prstGeom prst="line">
+            <a:avLst/>
+          </a:prstGeom>
+          <a:ln>
+            <a:headEnd type="none" w="med" len="med"/>
+            <a:tailEnd type="triangle" w="med" len="med"/>
+          </a:ln>
+        </p:spPr>
+        <p:style>
+          <a:lnRef idx="2">
+            <a:schemeClr val="dk1"/>
+          </a:lnRef>
+          <a:fillRef idx="0">
+            <a:schemeClr val="dk1"/>
+          </a:fillRef>
+          <a:effectRef idx="1">
+            <a:schemeClr val="dk1"/>
+          </a:effectRef>
+          <a:fontRef idx="minor">
+            <a:schemeClr val="tx1"/>
+          </a:fontRef>
+        </p:style>
+      </p:cxnSp>
+      <p:grpSp>
+        <p:nvGrpSpPr>
+          <p:cNvPr id="93" name="Group 92">
+            <a:extLst>
+              <a:ext uri="{FF2B5EF4-FFF2-40B4-BE49-F238E27FC236}">
+                <a16:creationId xmlns:a16="http://schemas.microsoft.com/office/drawing/2014/main" id="{F65FD5A6-177A-404A-A473-0C76A756848F}"/>
+              </a:ext>
+            </a:extLst>
+          </p:cNvPr>
+          <p:cNvGrpSpPr/>
+          <p:nvPr/>
+        </p:nvGrpSpPr>
+        <p:grpSpPr>
+          <a:xfrm>
+            <a:off x="5984691" y="2848478"/>
+            <a:ext cx="804694" cy="688259"/>
+            <a:chOff x="8821205" y="2416275"/>
+            <a:chExt cx="804694" cy="688259"/>
+          </a:xfrm>
+        </p:grpSpPr>
+        <p:sp>
+          <p:nvSpPr>
+            <p:cNvPr id="82" name="Rectangle 81">
+              <a:extLst>
+                <a:ext uri="{FF2B5EF4-FFF2-40B4-BE49-F238E27FC236}">
+                  <a16:creationId xmlns:a16="http://schemas.microsoft.com/office/drawing/2014/main" id="{04CC3BD1-4495-40C4-9A7A-9919BBC60E04}"/>
+                </a:ext>
+              </a:extLst>
+            </p:cNvPr>
+            <p:cNvSpPr/>
+            <p:nvPr/>
+          </p:nvSpPr>
+          <p:spPr>
+            <a:xfrm>
+              <a:off x="8821205" y="2416275"/>
+              <a:ext cx="804694" cy="688259"/>
+            </a:xfrm>
+            <a:prstGeom prst="rect">
+              <a:avLst/>
+            </a:prstGeom>
+          </p:spPr>
+          <p:style>
+            <a:lnRef idx="2">
+              <a:schemeClr val="dk1"/>
+            </a:lnRef>
+            <a:fillRef idx="1">
+              <a:schemeClr val="lt1"/>
+            </a:fillRef>
+            <a:effectRef idx="0">
+              <a:schemeClr val="dk1"/>
+            </a:effectRef>
+            <a:fontRef idx="minor">
+              <a:schemeClr val="dk1"/>
+            </a:fontRef>
+          </p:style>
+          <p:txBody>
+            <a:bodyPr rtlCol="0" anchor="ctr"/>
+            <a:lstStyle/>
+            <a:p>
+              <a:pPr algn="ctr"/>
+              <a:endParaRPr lang="en-US"/>
+            </a:p>
+          </p:txBody>
+        </p:sp>
+        <p:sp>
+          <p:nvSpPr>
+            <p:cNvPr id="85" name="Trapezoid 84">
+              <a:extLst>
+                <a:ext uri="{FF2B5EF4-FFF2-40B4-BE49-F238E27FC236}">
+                  <a16:creationId xmlns:a16="http://schemas.microsoft.com/office/drawing/2014/main" id="{7F44CDD4-CCA1-4B49-9719-5F33D396C1A7}"/>
+                </a:ext>
+              </a:extLst>
+            </p:cNvPr>
+            <p:cNvSpPr/>
+            <p:nvPr/>
+          </p:nvSpPr>
+          <p:spPr>
+            <a:xfrm rot="5400000">
+              <a:off x="8964886" y="2576078"/>
+              <a:ext cx="517332" cy="368654"/>
+            </a:xfrm>
+            <a:prstGeom prst="trapezoid">
+              <a:avLst>
+                <a:gd name="adj" fmla="val 35655"/>
+              </a:avLst>
+            </a:prstGeom>
+          </p:spPr>
+          <p:style>
+            <a:lnRef idx="2">
+              <a:schemeClr val="dk1"/>
+            </a:lnRef>
+            <a:fillRef idx="1">
+              <a:schemeClr val="lt1"/>
+            </a:fillRef>
+            <a:effectRef idx="0">
+              <a:schemeClr val="dk1"/>
+            </a:effectRef>
+            <a:fontRef idx="minor">
+              <a:schemeClr val="dk1"/>
+            </a:fontRef>
+          </p:style>
+          <p:txBody>
+            <a:bodyPr vert="vert270" rtlCol="0" anchor="ctr"/>
+            <a:lstStyle/>
+            <a:p>
+              <a:pPr algn="ctr"/>
+              <a:r>
+                <a:rPr lang="en-US" dirty="0">
+                  <a:latin typeface="Arial" panose="020B0604020202020204" pitchFamily="34" charset="0"/>
+                  <a:cs typeface="Arial" panose="020B0604020202020204" pitchFamily="34" charset="0"/>
+                  <a:sym typeface="Symbol" panose="05050102010706020507" pitchFamily="18" charset="2"/>
+                </a:rPr>
+                <a:t></a:t>
+              </a:r>
+              <a:endParaRPr lang="en-US" dirty="0">
+                <a:latin typeface="Arial" panose="020B0604020202020204" pitchFamily="34" charset="0"/>
+                <a:cs typeface="Arial" panose="020B0604020202020204" pitchFamily="34" charset="0"/>
+              </a:endParaRPr>
+            </a:p>
+          </p:txBody>
+        </p:sp>
+      </p:grpSp>
+      <p:cxnSp>
+        <p:nvCxnSpPr>
+          <p:cNvPr id="97" name="Straight Connector 96">
+            <a:extLst>
+              <a:ext uri="{FF2B5EF4-FFF2-40B4-BE49-F238E27FC236}">
+                <a16:creationId xmlns:a16="http://schemas.microsoft.com/office/drawing/2014/main" id="{8F5FDF47-9320-46FB-9B6B-CDF7891C16DF}"/>
+              </a:ext>
+            </a:extLst>
+          </p:cNvPr>
+          <p:cNvCxnSpPr>
+            <a:cxnSpLocks/>
+            <a:stCxn id="82" idx="3"/>
+            <a:endCxn id="3" idx="2"/>
+          </p:cNvCxnSpPr>
+          <p:nvPr/>
+        </p:nvCxnSpPr>
+        <p:spPr>
+          <a:xfrm>
+            <a:off x="6789385" y="3192608"/>
+            <a:ext cx="233937" cy="0"/>
+          </a:xfrm>
+          <a:prstGeom prst="line">
+            <a:avLst/>
+          </a:prstGeom>
+          <a:ln>
+            <a:headEnd type="none" w="med" len="med"/>
+            <a:tailEnd type="triangle" w="med" len="med"/>
+          </a:ln>
+        </p:spPr>
+        <p:style>
+          <a:lnRef idx="2">
+            <a:schemeClr val="dk1"/>
+          </a:lnRef>
+          <a:fillRef idx="0">
+            <a:schemeClr val="dk1"/>
+          </a:fillRef>
+          <a:effectRef idx="1">
+            <a:schemeClr val="dk1"/>
+          </a:effectRef>
+          <a:fontRef idx="minor">
+            <a:schemeClr val="tx1"/>
+          </a:fontRef>
+        </p:style>
+      </p:cxnSp>
+      <p:cxnSp>
+        <p:nvCxnSpPr>
+          <p:cNvPr id="100" name="Straight Connector 99">
+            <a:extLst>
+              <a:ext uri="{FF2B5EF4-FFF2-40B4-BE49-F238E27FC236}">
+                <a16:creationId xmlns:a16="http://schemas.microsoft.com/office/drawing/2014/main" id="{38504702-1576-48F9-AA60-74E6C0C03ACF}"/>
+              </a:ext>
+            </a:extLst>
+          </p:cNvPr>
+          <p:cNvCxnSpPr>
+            <a:cxnSpLocks/>
+            <a:stCxn id="25" idx="0"/>
+            <a:endCxn id="3" idx="4"/>
+          </p:cNvCxnSpPr>
+          <p:nvPr/>
+        </p:nvCxnSpPr>
+        <p:spPr>
+          <a:xfrm flipV="1">
+            <a:off x="7367452" y="3536737"/>
+            <a:ext cx="0" cy="336910"/>
+          </a:xfrm>
+          <a:prstGeom prst="line">
+            <a:avLst/>
+          </a:prstGeom>
+          <a:ln>
+            <a:headEnd type="none" w="med" len="med"/>
+            <a:tailEnd type="triangle" w="med" len="med"/>
+          </a:ln>
+        </p:spPr>
+        <p:style>
+          <a:lnRef idx="2">
+            <a:schemeClr val="dk1"/>
+          </a:lnRef>
+          <a:fillRef idx="0">
+            <a:schemeClr val="dk1"/>
+          </a:fillRef>
+          <a:effectRef idx="1">
+            <a:schemeClr val="dk1"/>
+          </a:effectRef>
+          <a:fontRef idx="minor">
+            <a:schemeClr val="tx1"/>
+          </a:fontRef>
+        </p:style>
+      </p:cxnSp>
+      <p:sp>
+        <p:nvSpPr>
+          <p:cNvPr id="166" name="TextBox 165">
+            <a:extLst>
+              <a:ext uri="{FF2B5EF4-FFF2-40B4-BE49-F238E27FC236}">
+                <a16:creationId xmlns:a16="http://schemas.microsoft.com/office/drawing/2014/main" id="{A3679C6A-C4EB-4227-8086-14C87012AEB0}"/>
+              </a:ext>
+            </a:extLst>
+          </p:cNvPr>
+          <p:cNvSpPr txBox="1"/>
+          <p:nvPr/>
+        </p:nvSpPr>
+        <p:spPr>
+          <a:xfrm>
+            <a:off x="337453" y="3701062"/>
+            <a:ext cx="694421" cy="400110"/>
+          </a:xfrm>
+          <a:prstGeom prst="rect">
+            <a:avLst/>
+          </a:prstGeom>
+          <a:noFill/>
+        </p:spPr>
+        <p:txBody>
+          <a:bodyPr wrap="none" rtlCol="0">
+            <a:spAutoFit/>
+          </a:bodyPr>
+          <a:lstStyle/>
+          <a:p>
+            <a:pPr algn="ctr"/>
+            <a:r>
+              <a:rPr lang="en-US" sz="1000" dirty="0">
+                <a:latin typeface="Segoe UI" panose="020B0502040204020203" pitchFamily="34" charset="0"/>
+                <a:cs typeface="Segoe UI" panose="020B0502040204020203" pitchFamily="34" charset="0"/>
+              </a:rPr>
+              <a:t>AO</a:t>
+            </a:r>
+          </a:p>
+          <a:p>
+            <a:pPr algn="ctr"/>
+            <a:r>
+              <a:rPr lang="en-US" sz="1000" dirty="0">
+                <a:latin typeface="Segoe UI" panose="020B0502040204020203" pitchFamily="34" charset="0"/>
+                <a:cs typeface="Segoe UI" panose="020B0502040204020203" pitchFamily="34" charset="0"/>
+              </a:rPr>
+              <a:t>oscillator</a:t>
+            </a:r>
+          </a:p>
+        </p:txBody>
+      </p:sp>
+      <p:sp>
+        <p:nvSpPr>
+          <p:cNvPr id="167" name="TextBox 166">
+            <a:extLst>
+              <a:ext uri="{FF2B5EF4-FFF2-40B4-BE49-F238E27FC236}">
+                <a16:creationId xmlns:a16="http://schemas.microsoft.com/office/drawing/2014/main" id="{3A7BD343-3EDB-4F14-8400-E5E9BA390853}"/>
+              </a:ext>
+            </a:extLst>
+          </p:cNvPr>
+          <p:cNvSpPr txBox="1"/>
+          <p:nvPr/>
+        </p:nvSpPr>
+        <p:spPr>
+          <a:xfrm>
+            <a:off x="1425933" y="3663935"/>
+            <a:ext cx="437940" cy="246221"/>
+          </a:xfrm>
+          <a:prstGeom prst="rect">
+            <a:avLst/>
+          </a:prstGeom>
+          <a:noFill/>
+        </p:spPr>
+        <p:txBody>
+          <a:bodyPr wrap="none" rtlCol="0">
+            <a:spAutoFit/>
+          </a:bodyPr>
+          <a:lstStyle/>
+          <a:p>
+            <a:pPr algn="ctr"/>
+            <a:r>
+              <a:rPr lang="en-US" sz="1000" dirty="0">
+                <a:latin typeface="Segoe UI" panose="020B0502040204020203" pitchFamily="34" charset="0"/>
+                <a:cs typeface="Segoe UI" panose="020B0502040204020203" pitchFamily="34" charset="0"/>
+              </a:rPr>
+              <a:t>DAC</a:t>
+            </a:r>
+          </a:p>
+        </p:txBody>
+      </p:sp>
+      <p:sp>
+        <p:nvSpPr>
+          <p:cNvPr id="169" name="TextBox 168">
+            <a:extLst>
+              <a:ext uri="{FF2B5EF4-FFF2-40B4-BE49-F238E27FC236}">
+                <a16:creationId xmlns:a16="http://schemas.microsoft.com/office/drawing/2014/main" id="{4C857096-2480-4339-94E4-53613DE10D3F}"/>
+              </a:ext>
+            </a:extLst>
+          </p:cNvPr>
+          <p:cNvSpPr txBox="1"/>
+          <p:nvPr/>
+        </p:nvSpPr>
+        <p:spPr>
+          <a:xfrm>
+            <a:off x="4251364" y="2511621"/>
+            <a:ext cx="513056" cy="246221"/>
+          </a:xfrm>
+          <a:prstGeom prst="rect">
+            <a:avLst/>
+          </a:prstGeom>
+          <a:noFill/>
+        </p:spPr>
+        <p:txBody>
+          <a:bodyPr wrap="square" rtlCol="0">
+            <a:spAutoFit/>
+          </a:bodyPr>
+          <a:lstStyle/>
+          <a:p>
+            <a:pPr algn="ctr"/>
+            <a:r>
+              <a:rPr lang="en-US" sz="1000" dirty="0">
+                <a:latin typeface="Segoe UI" panose="020B0502040204020203" pitchFamily="34" charset="0"/>
+                <a:cs typeface="Segoe UI" panose="020B0502040204020203" pitchFamily="34" charset="0"/>
+              </a:rPr>
+              <a:t>ADC</a:t>
+            </a:r>
+          </a:p>
+        </p:txBody>
+      </p:sp>
+      <p:sp>
+        <p:nvSpPr>
+          <p:cNvPr id="170" name="TextBox 169">
+            <a:extLst>
+              <a:ext uri="{FF2B5EF4-FFF2-40B4-BE49-F238E27FC236}">
+                <a16:creationId xmlns:a16="http://schemas.microsoft.com/office/drawing/2014/main" id="{FBD4AC27-2CD8-4EEB-8E69-4969E4E61CB4}"/>
+              </a:ext>
+            </a:extLst>
+          </p:cNvPr>
+          <p:cNvSpPr txBox="1"/>
+          <p:nvPr/>
+        </p:nvSpPr>
+        <p:spPr>
+          <a:xfrm>
+            <a:off x="5151519" y="2511621"/>
+            <a:ext cx="463588" cy="246221"/>
+          </a:xfrm>
+          <a:prstGeom prst="rect">
+            <a:avLst/>
+          </a:prstGeom>
+          <a:noFill/>
+        </p:spPr>
+        <p:txBody>
+          <a:bodyPr wrap="none" rtlCol="0">
+            <a:spAutoFit/>
+          </a:bodyPr>
+          <a:lstStyle/>
+          <a:p>
+            <a:pPr algn="ctr"/>
+            <a:r>
+              <a:rPr lang="en-US" sz="1000" dirty="0">
+                <a:latin typeface="Segoe UI" panose="020B0502040204020203" pitchFamily="34" charset="0"/>
+                <a:cs typeface="Segoe UI" panose="020B0502040204020203" pitchFamily="34" charset="0"/>
+              </a:rPr>
+              <a:t>Filter</a:t>
+            </a:r>
+          </a:p>
+        </p:txBody>
+      </p:sp>
+      <p:sp>
+        <p:nvSpPr>
+          <p:cNvPr id="171" name="TextBox 170">
+            <a:extLst>
+              <a:ext uri="{FF2B5EF4-FFF2-40B4-BE49-F238E27FC236}">
+                <a16:creationId xmlns:a16="http://schemas.microsoft.com/office/drawing/2014/main" id="{9736D2CA-25F5-42D1-9BC0-B3CF82D21965}"/>
+              </a:ext>
+            </a:extLst>
+          </p:cNvPr>
+          <p:cNvSpPr txBox="1"/>
+          <p:nvPr/>
+        </p:nvSpPr>
+        <p:spPr>
+          <a:xfrm>
+            <a:off x="6046341" y="2511621"/>
+            <a:ext cx="526106" cy="246221"/>
+          </a:xfrm>
+          <a:prstGeom prst="rect">
+            <a:avLst/>
+          </a:prstGeom>
+          <a:noFill/>
+        </p:spPr>
+        <p:txBody>
+          <a:bodyPr wrap="none" rtlCol="0">
+            <a:spAutoFit/>
+          </a:bodyPr>
+          <a:lstStyle/>
+          <a:p>
+            <a:pPr algn="ctr"/>
+            <a:r>
+              <a:rPr lang="en-US" sz="1000" dirty="0">
+                <a:latin typeface="Segoe UI" panose="020B0502040204020203" pitchFamily="34" charset="0"/>
+                <a:cs typeface="Segoe UI" panose="020B0502040204020203" pitchFamily="34" charset="0"/>
+              </a:rPr>
+              <a:t>Offset</a:t>
+            </a:r>
+          </a:p>
+        </p:txBody>
+      </p:sp>
+      <p:sp>
+        <p:nvSpPr>
+          <p:cNvPr id="172" name="TextBox 171">
+            <a:extLst>
+              <a:ext uri="{FF2B5EF4-FFF2-40B4-BE49-F238E27FC236}">
+                <a16:creationId xmlns:a16="http://schemas.microsoft.com/office/drawing/2014/main" id="{AF173508-64D3-4AB4-9FF0-53EDDCB829ED}"/>
+              </a:ext>
+            </a:extLst>
+          </p:cNvPr>
+          <p:cNvSpPr txBox="1"/>
+          <p:nvPr/>
+        </p:nvSpPr>
+        <p:spPr>
+          <a:xfrm>
+            <a:off x="7116420" y="2511621"/>
+            <a:ext cx="502062" cy="246221"/>
+          </a:xfrm>
+          <a:prstGeom prst="rect">
+            <a:avLst/>
+          </a:prstGeom>
+          <a:noFill/>
+        </p:spPr>
+        <p:txBody>
+          <a:bodyPr wrap="none" rtlCol="0">
+            <a:spAutoFit/>
+          </a:bodyPr>
+          <a:lstStyle/>
+          <a:p>
+            <a:pPr algn="ctr"/>
+            <a:r>
+              <a:rPr lang="en-US" sz="1000" dirty="0">
+                <a:latin typeface="Segoe UI" panose="020B0502040204020203" pitchFamily="34" charset="0"/>
+                <a:cs typeface="Segoe UI" panose="020B0502040204020203" pitchFamily="34" charset="0"/>
+              </a:rPr>
+              <a:t>Mixer</a:t>
+            </a:r>
+          </a:p>
+        </p:txBody>
+      </p:sp>
+      <p:sp>
+        <p:nvSpPr>
+          <p:cNvPr id="173" name="TextBox 172">
+            <a:extLst>
+              <a:ext uri="{FF2B5EF4-FFF2-40B4-BE49-F238E27FC236}">
+                <a16:creationId xmlns:a16="http://schemas.microsoft.com/office/drawing/2014/main" id="{6307556F-9715-48C0-9006-138819BE7EEF}"/>
+              </a:ext>
+            </a:extLst>
+          </p:cNvPr>
+          <p:cNvSpPr txBox="1"/>
+          <p:nvPr/>
+        </p:nvSpPr>
+        <p:spPr>
+          <a:xfrm>
+            <a:off x="7843646" y="2511621"/>
+            <a:ext cx="803062" cy="246221"/>
+          </a:xfrm>
+          <a:prstGeom prst="rect">
+            <a:avLst/>
+          </a:prstGeom>
+          <a:noFill/>
+        </p:spPr>
+        <p:txBody>
+          <a:bodyPr wrap="square" rtlCol="0">
+            <a:spAutoFit/>
+          </a:bodyPr>
+          <a:lstStyle/>
+          <a:p>
+            <a:pPr algn="ctr"/>
+            <a:r>
+              <a:rPr lang="en-US" sz="1000" dirty="0">
+                <a:latin typeface="Segoe UI" panose="020B0502040204020203" pitchFamily="34" charset="0"/>
+                <a:cs typeface="Segoe UI" panose="020B0502040204020203" pitchFamily="34" charset="0"/>
+              </a:rPr>
+              <a:t>REF Filter</a:t>
+            </a:r>
+          </a:p>
+        </p:txBody>
+      </p:sp>
+      <p:grpSp>
+        <p:nvGrpSpPr>
+          <p:cNvPr id="179" name="Group 178">
+            <a:extLst>
+              <a:ext uri="{FF2B5EF4-FFF2-40B4-BE49-F238E27FC236}">
+                <a16:creationId xmlns:a16="http://schemas.microsoft.com/office/drawing/2014/main" id="{CCC35BDD-CD97-48B9-98B6-A36A45DD5C52}"/>
+              </a:ext>
+            </a:extLst>
+          </p:cNvPr>
+          <p:cNvGrpSpPr/>
+          <p:nvPr/>
+        </p:nvGrpSpPr>
+        <p:grpSpPr>
+          <a:xfrm>
+            <a:off x="4980966" y="2848478"/>
+            <a:ext cx="804694" cy="688259"/>
+            <a:chOff x="6197920" y="2823428"/>
+            <a:chExt cx="804694" cy="688259"/>
+          </a:xfrm>
+        </p:grpSpPr>
+        <p:sp>
+          <p:nvSpPr>
+            <p:cNvPr id="27" name="Rectangle 26">
+              <a:extLst>
+                <a:ext uri="{FF2B5EF4-FFF2-40B4-BE49-F238E27FC236}">
+                  <a16:creationId xmlns:a16="http://schemas.microsoft.com/office/drawing/2014/main" id="{6F55BA79-F077-4CA2-A765-23F265851C59}"/>
+                </a:ext>
+              </a:extLst>
+            </p:cNvPr>
+            <p:cNvSpPr/>
+            <p:nvPr/>
+          </p:nvSpPr>
+          <p:spPr>
+            <a:xfrm>
+              <a:off x="6197920" y="2823428"/>
+              <a:ext cx="804694" cy="688259"/>
+            </a:xfrm>
+            <a:prstGeom prst="rect">
+              <a:avLst/>
+            </a:prstGeom>
+          </p:spPr>
+          <p:style>
+            <a:lnRef idx="2">
+              <a:schemeClr val="dk1"/>
+            </a:lnRef>
+            <a:fillRef idx="1">
+              <a:schemeClr val="lt1"/>
+            </a:fillRef>
+            <a:effectRef idx="0">
+              <a:schemeClr val="dk1"/>
+            </a:effectRef>
+            <a:fontRef idx="minor">
+              <a:schemeClr val="dk1"/>
+            </a:fontRef>
+          </p:style>
+          <p:txBody>
+            <a:bodyPr rtlCol="0" anchor="ctr"/>
+            <a:lstStyle/>
+            <a:p>
+              <a:pPr algn="ctr"/>
+              <a:endParaRPr lang="en-US" dirty="0"/>
+            </a:p>
+          </p:txBody>
+        </p:sp>
+        <p:sp>
+          <p:nvSpPr>
+            <p:cNvPr id="28" name="Freeform: Shape 27">
+              <a:extLst>
+                <a:ext uri="{FF2B5EF4-FFF2-40B4-BE49-F238E27FC236}">
+                  <a16:creationId xmlns:a16="http://schemas.microsoft.com/office/drawing/2014/main" id="{099DCA09-B9C2-4DA8-B6DC-67DEA311FF43}"/>
+                </a:ext>
+              </a:extLst>
+            </p:cNvPr>
+            <p:cNvSpPr/>
+            <p:nvPr/>
+          </p:nvSpPr>
+          <p:spPr>
+            <a:xfrm>
+              <a:off x="6306219" y="2928422"/>
+              <a:ext cx="603250" cy="427471"/>
+            </a:xfrm>
+            <a:custGeom>
+              <a:avLst/>
+              <a:gdLst>
+                <a:gd name="connsiteX0" fmla="*/ 0 w 603250"/>
+                <a:gd name="connsiteY0" fmla="*/ 36107 h 461557"/>
+                <a:gd name="connsiteX1" fmla="*/ 374650 w 603250"/>
+                <a:gd name="connsiteY1" fmla="*/ 42457 h 461557"/>
+                <a:gd name="connsiteX2" fmla="*/ 603250 w 603250"/>
+                <a:gd name="connsiteY2" fmla="*/ 461557 h 461557"/>
+                <a:gd name="connsiteX0" fmla="*/ 0 w 603250"/>
+                <a:gd name="connsiteY0" fmla="*/ 7090 h 432540"/>
+                <a:gd name="connsiteX1" fmla="*/ 422275 w 603250"/>
+                <a:gd name="connsiteY1" fmla="*/ 130121 h 432540"/>
+                <a:gd name="connsiteX2" fmla="*/ 603250 w 603250"/>
+                <a:gd name="connsiteY2" fmla="*/ 432540 h 432540"/>
+                <a:gd name="connsiteX0" fmla="*/ 0 w 603250"/>
+                <a:gd name="connsiteY0" fmla="*/ 0 h 425450"/>
+                <a:gd name="connsiteX1" fmla="*/ 422275 w 603250"/>
+                <a:gd name="connsiteY1" fmla="*/ 123031 h 425450"/>
+                <a:gd name="connsiteX2" fmla="*/ 603250 w 603250"/>
+                <a:gd name="connsiteY2" fmla="*/ 425450 h 425450"/>
+                <a:gd name="connsiteX0" fmla="*/ 0 w 603250"/>
+                <a:gd name="connsiteY0" fmla="*/ 0 h 425450"/>
+                <a:gd name="connsiteX1" fmla="*/ 453231 w 603250"/>
+                <a:gd name="connsiteY1" fmla="*/ 106362 h 425450"/>
+                <a:gd name="connsiteX2" fmla="*/ 603250 w 603250"/>
+                <a:gd name="connsiteY2" fmla="*/ 425450 h 425450"/>
+                <a:gd name="connsiteX0" fmla="*/ 0 w 603250"/>
+                <a:gd name="connsiteY0" fmla="*/ 0 h 425450"/>
+                <a:gd name="connsiteX1" fmla="*/ 453231 w 603250"/>
+                <a:gd name="connsiteY1" fmla="*/ 106362 h 425450"/>
+                <a:gd name="connsiteX2" fmla="*/ 603250 w 603250"/>
+                <a:gd name="connsiteY2" fmla="*/ 425450 h 425450"/>
+                <a:gd name="connsiteX0" fmla="*/ 0 w 603250"/>
+                <a:gd name="connsiteY0" fmla="*/ 0 h 425450"/>
+                <a:gd name="connsiteX1" fmla="*/ 419894 w 603250"/>
+                <a:gd name="connsiteY1" fmla="*/ 58737 h 425450"/>
+                <a:gd name="connsiteX2" fmla="*/ 603250 w 603250"/>
+                <a:gd name="connsiteY2" fmla="*/ 425450 h 425450"/>
+                <a:gd name="connsiteX0" fmla="*/ 0 w 603250"/>
+                <a:gd name="connsiteY0" fmla="*/ 0 h 425450"/>
+                <a:gd name="connsiteX1" fmla="*/ 419894 w 603250"/>
+                <a:gd name="connsiteY1" fmla="*/ 58737 h 425450"/>
+                <a:gd name="connsiteX2" fmla="*/ 603250 w 603250"/>
+                <a:gd name="connsiteY2" fmla="*/ 425450 h 425450"/>
+                <a:gd name="connsiteX0" fmla="*/ 0 w 603250"/>
+                <a:gd name="connsiteY0" fmla="*/ 2021 h 427471"/>
+                <a:gd name="connsiteX1" fmla="*/ 419894 w 603250"/>
+                <a:gd name="connsiteY1" fmla="*/ 60758 h 427471"/>
+                <a:gd name="connsiteX2" fmla="*/ 603250 w 603250"/>
+                <a:gd name="connsiteY2" fmla="*/ 427471 h 427471"/>
+                <a:gd name="connsiteX0" fmla="*/ 0 w 603250"/>
+                <a:gd name="connsiteY0" fmla="*/ 2021 h 427471"/>
+                <a:gd name="connsiteX1" fmla="*/ 419894 w 603250"/>
+                <a:gd name="connsiteY1" fmla="*/ 60758 h 427471"/>
+                <a:gd name="connsiteX2" fmla="*/ 603250 w 603250"/>
+                <a:gd name="connsiteY2" fmla="*/ 427471 h 427471"/>
+              </a:gdLst>
+              <a:ahLst/>
+              <a:cxnLst>
+                <a:cxn ang="0">
+                  <a:pos x="connsiteX0" y="connsiteY0"/>
+                </a:cxn>
+                <a:cxn ang="0">
+                  <a:pos x="connsiteX1" y="connsiteY1"/>
+                </a:cxn>
+                <a:cxn ang="0">
+                  <a:pos x="connsiteX2" y="connsiteY2"/>
+                </a:cxn>
+              </a:cxnLst>
+              <a:rect l="l" t="t" r="r" b="b"/>
+              <a:pathLst>
+                <a:path w="603250" h="427471">
+                  <a:moveTo>
+                    <a:pt x="0" y="2021"/>
+                  </a:moveTo>
+                  <a:cubicBezTo>
+                    <a:pt x="244210" y="-1683"/>
+                    <a:pt x="314590" y="-7769"/>
+                    <a:pt x="419894" y="60758"/>
+                  </a:cubicBezTo>
+                  <a:cubicBezTo>
+                    <a:pt x="525198" y="129285"/>
+                    <a:pt x="543984" y="250994"/>
+                    <a:pt x="603250" y="427471"/>
+                  </a:cubicBezTo>
+                </a:path>
+              </a:pathLst>
+            </a:custGeom>
+          </p:spPr>
+          <p:style>
+            <a:lnRef idx="2">
+              <a:schemeClr val="dk1"/>
+            </a:lnRef>
+            <a:fillRef idx="1">
+              <a:schemeClr val="lt1"/>
+            </a:fillRef>
+            <a:effectRef idx="0">
+              <a:schemeClr val="dk1"/>
+            </a:effectRef>
+            <a:fontRef idx="minor">
+              <a:schemeClr val="dk1"/>
+            </a:fontRef>
+          </p:style>
+          <p:txBody>
+            <a:bodyPr rtlCol="0" anchor="ctr"/>
+            <a:lstStyle/>
+            <a:p>
+              <a:pPr algn="ctr"/>
+              <a:endParaRPr lang="en-US" dirty="0"/>
+            </a:p>
+          </p:txBody>
+        </p:sp>
+        <p:sp>
+          <p:nvSpPr>
+            <p:cNvPr id="174" name="Freeform: Shape 173">
+              <a:extLst>
+                <a:ext uri="{FF2B5EF4-FFF2-40B4-BE49-F238E27FC236}">
+                  <a16:creationId xmlns:a16="http://schemas.microsoft.com/office/drawing/2014/main" id="{91692D0E-349F-479B-B50F-4C18CEFE4CAB}"/>
+                </a:ext>
+              </a:extLst>
+            </p:cNvPr>
+            <p:cNvSpPr/>
+            <p:nvPr/>
+          </p:nvSpPr>
+          <p:spPr>
+            <a:xfrm>
+              <a:off x="6315076" y="2940843"/>
+              <a:ext cx="578643" cy="278805"/>
+            </a:xfrm>
+            <a:custGeom>
+              <a:avLst/>
+              <a:gdLst>
+                <a:gd name="connsiteX0" fmla="*/ 0 w 592931"/>
+                <a:gd name="connsiteY0" fmla="*/ 33337 h 447782"/>
+                <a:gd name="connsiteX1" fmla="*/ 330993 w 592931"/>
+                <a:gd name="connsiteY1" fmla="*/ 447675 h 447782"/>
+                <a:gd name="connsiteX2" fmla="*/ 592931 w 592931"/>
+                <a:gd name="connsiteY2" fmla="*/ 0 h 447782"/>
+                <a:gd name="connsiteX0" fmla="*/ 0 w 578643"/>
+                <a:gd name="connsiteY0" fmla="*/ 7143 h 447679"/>
+                <a:gd name="connsiteX1" fmla="*/ 316705 w 578643"/>
+                <a:gd name="connsiteY1" fmla="*/ 447675 h 447679"/>
+                <a:gd name="connsiteX2" fmla="*/ 578643 w 578643"/>
+                <a:gd name="connsiteY2" fmla="*/ 0 h 447679"/>
+                <a:gd name="connsiteX0" fmla="*/ 0 w 578643"/>
+                <a:gd name="connsiteY0" fmla="*/ 7143 h 447677"/>
+                <a:gd name="connsiteX1" fmla="*/ 316705 w 578643"/>
+                <a:gd name="connsiteY1" fmla="*/ 447675 h 447677"/>
+                <a:gd name="connsiteX2" fmla="*/ 578643 w 578643"/>
+                <a:gd name="connsiteY2" fmla="*/ 0 h 447677"/>
+                <a:gd name="connsiteX0" fmla="*/ 0 w 578643"/>
+                <a:gd name="connsiteY0" fmla="*/ 7143 h 447677"/>
+                <a:gd name="connsiteX1" fmla="*/ 316705 w 578643"/>
+                <a:gd name="connsiteY1" fmla="*/ 447675 h 447677"/>
+                <a:gd name="connsiteX2" fmla="*/ 578643 w 578643"/>
+                <a:gd name="connsiteY2" fmla="*/ 0 h 447677"/>
+                <a:gd name="connsiteX0" fmla="*/ 0 w 578643"/>
+                <a:gd name="connsiteY0" fmla="*/ 7143 h 447675"/>
+                <a:gd name="connsiteX1" fmla="*/ 316705 w 578643"/>
+                <a:gd name="connsiteY1" fmla="*/ 447675 h 447675"/>
+                <a:gd name="connsiteX2" fmla="*/ 578643 w 578643"/>
+                <a:gd name="connsiteY2" fmla="*/ 0 h 447675"/>
+                <a:gd name="connsiteX0" fmla="*/ 0 w 578643"/>
+                <a:gd name="connsiteY0" fmla="*/ 7143 h 447675"/>
+                <a:gd name="connsiteX1" fmla="*/ 316705 w 578643"/>
+                <a:gd name="connsiteY1" fmla="*/ 447675 h 447675"/>
+                <a:gd name="connsiteX2" fmla="*/ 578643 w 578643"/>
+                <a:gd name="connsiteY2" fmla="*/ 0 h 447675"/>
+                <a:gd name="connsiteX0" fmla="*/ 0 w 578643"/>
+                <a:gd name="connsiteY0" fmla="*/ 7143 h 447675"/>
+                <a:gd name="connsiteX1" fmla="*/ 316705 w 578643"/>
+                <a:gd name="connsiteY1" fmla="*/ 447675 h 447675"/>
+                <a:gd name="connsiteX2" fmla="*/ 578643 w 578643"/>
+                <a:gd name="connsiteY2" fmla="*/ 0 h 447675"/>
+                <a:gd name="connsiteX0" fmla="*/ 0 w 578643"/>
+                <a:gd name="connsiteY0" fmla="*/ 7143 h 447675"/>
+                <a:gd name="connsiteX1" fmla="*/ 316705 w 578643"/>
+                <a:gd name="connsiteY1" fmla="*/ 447675 h 447675"/>
+                <a:gd name="connsiteX2" fmla="*/ 578643 w 578643"/>
+                <a:gd name="connsiteY2" fmla="*/ 0 h 447675"/>
+                <a:gd name="connsiteX0" fmla="*/ 0 w 578643"/>
+                <a:gd name="connsiteY0" fmla="*/ 7143 h 445294"/>
+                <a:gd name="connsiteX1" fmla="*/ 314324 w 578643"/>
+                <a:gd name="connsiteY1" fmla="*/ 445294 h 445294"/>
+                <a:gd name="connsiteX2" fmla="*/ 578643 w 578643"/>
+                <a:gd name="connsiteY2" fmla="*/ 0 h 445294"/>
+                <a:gd name="connsiteX0" fmla="*/ 0 w 578643"/>
+                <a:gd name="connsiteY0" fmla="*/ 7143 h 445294"/>
+                <a:gd name="connsiteX1" fmla="*/ 314324 w 578643"/>
+                <a:gd name="connsiteY1" fmla="*/ 445294 h 445294"/>
+                <a:gd name="connsiteX2" fmla="*/ 578643 w 578643"/>
+                <a:gd name="connsiteY2" fmla="*/ 0 h 445294"/>
+              </a:gdLst>
+              <a:ahLst/>
+              <a:cxnLst>
+                <a:cxn ang="0">
+                  <a:pos x="connsiteX0" y="connsiteY0"/>
+                </a:cxn>
+                <a:cxn ang="0">
+                  <a:pos x="connsiteX1" y="connsiteY1"/>
+                </a:cxn>
+                <a:cxn ang="0">
+                  <a:pos x="connsiteX2" y="connsiteY2"/>
+                </a:cxn>
+              </a:cxnLst>
+              <a:rect l="l" t="t" r="r" b="b"/>
+              <a:pathLst>
+                <a:path w="578643" h="445294">
+                  <a:moveTo>
+                    <a:pt x="0" y="7143"/>
+                  </a:moveTo>
+                  <a:cubicBezTo>
+                    <a:pt x="328016" y="12302"/>
+                    <a:pt x="296465" y="294083"/>
+                    <a:pt x="314324" y="445294"/>
+                  </a:cubicBezTo>
+                  <a:cubicBezTo>
+                    <a:pt x="332183" y="294086"/>
+                    <a:pt x="299441" y="23416"/>
+                    <a:pt x="578643" y="0"/>
+                  </a:cubicBezTo>
+                </a:path>
+              </a:pathLst>
+            </a:custGeom>
+            <a:noFill/>
+          </p:spPr>
+          <p:style>
+            <a:lnRef idx="2">
+              <a:schemeClr val="accent1">
+                <a:shade val="50000"/>
+              </a:schemeClr>
+            </a:lnRef>
+            <a:fillRef idx="1">
+              <a:schemeClr val="accent1"/>
+            </a:fillRef>
+            <a:effectRef idx="0">
+              <a:schemeClr val="accent1"/>
+            </a:effectRef>
+            <a:fontRef idx="minor">
+              <a:schemeClr val="lt1"/>
+            </a:fontRef>
+          </p:style>
+          <p:txBody>
+            <a:bodyPr rtlCol="0" anchor="ctr"/>
+            <a:lstStyle/>
+            <a:p>
+              <a:pPr algn="ctr"/>
+              <a:endParaRPr lang="en-US"/>
+            </a:p>
+          </p:txBody>
+        </p:sp>
+      </p:grpSp>
+      <p:sp>
+        <p:nvSpPr>
+          <p:cNvPr id="175" name="TextBox 174">
+            <a:extLst>
+              <a:ext uri="{FF2B5EF4-FFF2-40B4-BE49-F238E27FC236}">
+                <a16:creationId xmlns:a16="http://schemas.microsoft.com/office/drawing/2014/main" id="{C8262C68-A568-4B65-9ED8-04C0A0062CBC}"/>
+              </a:ext>
+            </a:extLst>
+          </p:cNvPr>
+          <p:cNvSpPr txBox="1"/>
+          <p:nvPr/>
+        </p:nvSpPr>
+        <p:spPr>
+          <a:xfrm>
+            <a:off x="7492421" y="4277298"/>
+            <a:ext cx="694421" cy="400110"/>
+          </a:xfrm>
+          <a:prstGeom prst="rect">
+            <a:avLst/>
+          </a:prstGeom>
+          <a:noFill/>
+        </p:spPr>
+        <p:txBody>
+          <a:bodyPr wrap="none" rtlCol="0">
+            <a:spAutoFit/>
+          </a:bodyPr>
+          <a:lstStyle/>
+          <a:p>
+            <a:pPr algn="ctr"/>
+            <a:r>
+              <a:rPr lang="en-US" sz="1000" dirty="0">
+                <a:latin typeface="Segoe UI" panose="020B0502040204020203" pitchFamily="34" charset="0"/>
+                <a:cs typeface="Segoe UI" panose="020B0502040204020203" pitchFamily="34" charset="0"/>
+              </a:rPr>
+              <a:t>REF</a:t>
+            </a:r>
+          </a:p>
+          <a:p>
+            <a:pPr algn="ctr"/>
+            <a:r>
+              <a:rPr lang="en-US" sz="1000" dirty="0">
+                <a:latin typeface="Segoe UI" panose="020B0502040204020203" pitchFamily="34" charset="0"/>
+                <a:cs typeface="Segoe UI" panose="020B0502040204020203" pitchFamily="34" charset="0"/>
+              </a:rPr>
+              <a:t>oscillator</a:t>
+            </a:r>
+          </a:p>
+        </p:txBody>
+      </p:sp>
+      <p:grpSp>
+        <p:nvGrpSpPr>
+          <p:cNvPr id="12" name="Group 11">
+            <a:extLst>
+              <a:ext uri="{FF2B5EF4-FFF2-40B4-BE49-F238E27FC236}">
+                <a16:creationId xmlns:a16="http://schemas.microsoft.com/office/drawing/2014/main" id="{3EC32AC4-6AE0-4946-AED6-E3C666E9420F}"/>
+              </a:ext>
+            </a:extLst>
+          </p:cNvPr>
+          <p:cNvGrpSpPr/>
+          <p:nvPr/>
+        </p:nvGrpSpPr>
+        <p:grpSpPr>
+          <a:xfrm>
+            <a:off x="2337556" y="1132900"/>
+            <a:ext cx="1976428" cy="858845"/>
+            <a:chOff x="861282" y="1745569"/>
+            <a:chExt cx="8028344" cy="3488670"/>
+          </a:xfrm>
+        </p:grpSpPr>
+        <p:pic>
+          <p:nvPicPr>
+            <p:cNvPr id="6" name="Picture 5">
+              <a:extLst>
+                <a:ext uri="{FF2B5EF4-FFF2-40B4-BE49-F238E27FC236}">
+                  <a16:creationId xmlns:a16="http://schemas.microsoft.com/office/drawing/2014/main" id="{749F7603-5C2B-4B61-8AE6-9CCAB480F0CD}"/>
+                </a:ext>
+              </a:extLst>
+            </p:cNvPr>
+            <p:cNvPicPr>
+              <a:picLocks noChangeAspect="1"/>
+            </p:cNvPicPr>
+            <p:nvPr/>
+          </p:nvPicPr>
+          <p:blipFill rotWithShape="1">
+            <a:blip r:embed="rId2">
+              <a:extLst>
+                <a:ext uri="{28A0092B-C50C-407E-A947-70E740481C1C}">
+                  <a14:useLocalDpi xmlns:a14="http://schemas.microsoft.com/office/drawing/2010/main" val="0"/>
+                </a:ext>
+              </a:extLst>
+            </a:blip>
+            <a:srcRect t="3400" r="47182"/>
+            <a:stretch/>
+          </p:blipFill>
+          <p:spPr>
+            <a:xfrm>
+              <a:off x="861282" y="1746503"/>
+              <a:ext cx="5529742" cy="3487736"/>
+            </a:xfrm>
+            <a:prstGeom prst="rect">
+              <a:avLst/>
+            </a:prstGeom>
+          </p:spPr>
+        </p:pic>
+        <p:sp>
+          <p:nvSpPr>
+            <p:cNvPr id="9" name="Rectangle 8">
+              <a:extLst>
+                <a:ext uri="{FF2B5EF4-FFF2-40B4-BE49-F238E27FC236}">
+                  <a16:creationId xmlns:a16="http://schemas.microsoft.com/office/drawing/2014/main" id="{A3FF1C80-570B-4CA0-98B2-35B57C9980D7}"/>
+                </a:ext>
+              </a:extLst>
+            </p:cNvPr>
+            <p:cNvSpPr/>
+            <p:nvPr/>
+          </p:nvSpPr>
+          <p:spPr>
+            <a:xfrm>
+              <a:off x="861282" y="1746504"/>
+              <a:ext cx="272574" cy="246888"/>
+            </a:xfrm>
+            <a:prstGeom prst="rect">
+              <a:avLst/>
+            </a:prstGeom>
+            <a:ln>
+              <a:noFill/>
+            </a:ln>
+          </p:spPr>
+          <p:style>
+            <a:lnRef idx="2">
+              <a:schemeClr val="accent1"/>
+            </a:lnRef>
+            <a:fillRef idx="1">
+              <a:schemeClr val="lt1"/>
+            </a:fillRef>
+            <a:effectRef idx="0">
+              <a:schemeClr val="accent1"/>
+            </a:effectRef>
+            <a:fontRef idx="minor">
+              <a:schemeClr val="dk1"/>
+            </a:fontRef>
+          </p:style>
+          <p:txBody>
+            <a:bodyPr rtlCol="0" anchor="ctr"/>
+            <a:lstStyle/>
+            <a:p>
+              <a:pPr algn="ctr"/>
+              <a:endParaRPr lang="en-US"/>
+            </a:p>
+          </p:txBody>
+        </p:sp>
+        <p:sp>
+          <p:nvSpPr>
+            <p:cNvPr id="60" name="Rectangle 59">
+              <a:extLst>
+                <a:ext uri="{FF2B5EF4-FFF2-40B4-BE49-F238E27FC236}">
+                  <a16:creationId xmlns:a16="http://schemas.microsoft.com/office/drawing/2014/main" id="{A86FE6B4-9FEF-4C9C-8E93-00E8CA02D11C}"/>
+                </a:ext>
+              </a:extLst>
+            </p:cNvPr>
+            <p:cNvSpPr/>
+            <p:nvPr/>
+          </p:nvSpPr>
+          <p:spPr>
+            <a:xfrm>
+              <a:off x="5918239" y="1746504"/>
+              <a:ext cx="272574" cy="246888"/>
+            </a:xfrm>
+            <a:prstGeom prst="rect">
+              <a:avLst/>
+            </a:prstGeom>
+            <a:ln>
+              <a:noFill/>
+            </a:ln>
+          </p:spPr>
+          <p:style>
+            <a:lnRef idx="2">
+              <a:schemeClr val="accent1"/>
+            </a:lnRef>
+            <a:fillRef idx="1">
+              <a:schemeClr val="lt1"/>
+            </a:fillRef>
+            <a:effectRef idx="0">
+              <a:schemeClr val="accent1"/>
+            </a:effectRef>
+            <a:fontRef idx="minor">
+              <a:schemeClr val="dk1"/>
+            </a:fontRef>
+          </p:style>
+          <p:txBody>
+            <a:bodyPr rtlCol="0" anchor="ctr"/>
+            <a:lstStyle/>
+            <a:p>
+              <a:pPr algn="ctr"/>
+              <a:endParaRPr lang="en-US"/>
+            </a:p>
+          </p:txBody>
+        </p:sp>
+        <p:sp>
+          <p:nvSpPr>
+            <p:cNvPr id="61" name="Rectangle 60">
+              <a:extLst>
+                <a:ext uri="{FF2B5EF4-FFF2-40B4-BE49-F238E27FC236}">
+                  <a16:creationId xmlns:a16="http://schemas.microsoft.com/office/drawing/2014/main" id="{76020A38-6695-41F9-BC0C-5E66FE142223}"/>
+                </a:ext>
+              </a:extLst>
+            </p:cNvPr>
+            <p:cNvSpPr/>
+            <p:nvPr/>
+          </p:nvSpPr>
+          <p:spPr>
+            <a:xfrm>
+              <a:off x="8617052" y="1745569"/>
+              <a:ext cx="272574" cy="246888"/>
+            </a:xfrm>
+            <a:prstGeom prst="rect">
+              <a:avLst/>
+            </a:prstGeom>
+            <a:ln>
+              <a:noFill/>
+            </a:ln>
+          </p:spPr>
+          <p:style>
+            <a:lnRef idx="2">
+              <a:schemeClr val="accent1"/>
+            </a:lnRef>
+            <a:fillRef idx="1">
+              <a:schemeClr val="lt1"/>
+            </a:fillRef>
+            <a:effectRef idx="0">
+              <a:schemeClr val="accent1"/>
+            </a:effectRef>
+            <a:fontRef idx="minor">
+              <a:schemeClr val="dk1"/>
+            </a:fontRef>
+          </p:style>
+          <p:txBody>
+            <a:bodyPr rtlCol="0" anchor="ctr"/>
+            <a:lstStyle/>
+            <a:p>
+              <a:pPr algn="ctr"/>
+              <a:endParaRPr lang="en-US"/>
+            </a:p>
+          </p:txBody>
+        </p:sp>
+      </p:grpSp>
+      <p:sp>
+        <p:nvSpPr>
+          <p:cNvPr id="47" name="TextBox 46">
+            <a:extLst>
+              <a:ext uri="{FF2B5EF4-FFF2-40B4-BE49-F238E27FC236}">
+                <a16:creationId xmlns:a16="http://schemas.microsoft.com/office/drawing/2014/main" id="{98F20934-D079-4C57-9045-F32A2F9DC154}"/>
+              </a:ext>
+            </a:extLst>
+          </p:cNvPr>
+          <p:cNvSpPr txBox="1"/>
+          <p:nvPr/>
+        </p:nvSpPr>
+        <p:spPr>
+          <a:xfrm>
+            <a:off x="1439935" y="1569306"/>
+            <a:ext cx="699230" cy="430887"/>
+          </a:xfrm>
+          <a:prstGeom prst="rect">
+            <a:avLst/>
+          </a:prstGeom>
+          <a:noFill/>
+        </p:spPr>
+        <p:txBody>
+          <a:bodyPr wrap="none" rtlCol="0">
+            <a:spAutoFit/>
+          </a:bodyPr>
+          <a:lstStyle/>
+          <a:p>
+            <a:pPr algn="ctr"/>
+            <a:r>
+              <a:rPr lang="en-US" sz="1100" dirty="0">
+                <a:latin typeface="Segoe UI" panose="020B0502040204020203" pitchFamily="34" charset="0"/>
+                <a:cs typeface="Segoe UI" panose="020B0502040204020203" pitchFamily="34" charset="0"/>
+              </a:rPr>
+              <a:t>AO1</a:t>
+            </a:r>
+          </a:p>
+          <a:p>
+            <a:pPr algn="ctr"/>
+            <a:r>
+              <a:rPr lang="en-US" sz="1100" dirty="0">
+                <a:latin typeface="Segoe UI" panose="020B0502040204020203" pitchFamily="34" charset="0"/>
+                <a:cs typeface="Segoe UI" panose="020B0502040204020203" pitchFamily="34" charset="0"/>
+              </a:rPr>
+              <a:t>(Source)</a:t>
+            </a:r>
+          </a:p>
+        </p:txBody>
+      </p:sp>
+      <p:sp>
+        <p:nvSpPr>
+          <p:cNvPr id="81" name="TextBox 80">
+            <a:extLst>
+              <a:ext uri="{FF2B5EF4-FFF2-40B4-BE49-F238E27FC236}">
+                <a16:creationId xmlns:a16="http://schemas.microsoft.com/office/drawing/2014/main" id="{CA69074B-BAAA-4CAE-BA9C-63EB8B4DE04A}"/>
+              </a:ext>
+            </a:extLst>
+          </p:cNvPr>
+          <p:cNvSpPr txBox="1"/>
+          <p:nvPr/>
+        </p:nvSpPr>
+        <p:spPr>
+          <a:xfrm>
+            <a:off x="3860029" y="1577995"/>
+            <a:ext cx="606255" cy="430887"/>
+          </a:xfrm>
+          <a:prstGeom prst="rect">
+            <a:avLst/>
+          </a:prstGeom>
+          <a:noFill/>
+        </p:spPr>
+        <p:txBody>
+          <a:bodyPr wrap="none" rtlCol="0">
+            <a:spAutoFit/>
+          </a:bodyPr>
+          <a:lstStyle/>
+          <a:p>
+            <a:pPr algn="ctr"/>
+            <a:r>
+              <a:rPr lang="en-US" sz="1100" dirty="0">
+                <a:latin typeface="Segoe UI" panose="020B0502040204020203" pitchFamily="34" charset="0"/>
+                <a:cs typeface="Segoe UI" panose="020B0502040204020203" pitchFamily="34" charset="0"/>
+              </a:rPr>
+              <a:t>AI1</a:t>
+            </a:r>
+          </a:p>
+          <a:p>
+            <a:pPr algn="ctr"/>
+            <a:r>
+              <a:rPr lang="en-US" sz="1100" dirty="0">
+                <a:latin typeface="Segoe UI" panose="020B0502040204020203" pitchFamily="34" charset="0"/>
+                <a:cs typeface="Segoe UI" panose="020B0502040204020203" pitchFamily="34" charset="0"/>
+              </a:rPr>
+              <a:t>(Drain)</a:t>
+            </a:r>
+          </a:p>
+        </p:txBody>
+      </p:sp>
+      <p:sp>
+        <p:nvSpPr>
+          <p:cNvPr id="83" name="TextBox 82">
+            <a:extLst>
+              <a:ext uri="{FF2B5EF4-FFF2-40B4-BE49-F238E27FC236}">
+                <a16:creationId xmlns:a16="http://schemas.microsoft.com/office/drawing/2014/main" id="{901D44C0-C2DF-40FE-B607-CEF6AF4DA5F2}"/>
+              </a:ext>
+            </a:extLst>
+          </p:cNvPr>
+          <p:cNvSpPr txBox="1"/>
+          <p:nvPr/>
+        </p:nvSpPr>
+        <p:spPr>
+          <a:xfrm>
+            <a:off x="2703969" y="863498"/>
+            <a:ext cx="561371" cy="430887"/>
+          </a:xfrm>
+          <a:prstGeom prst="rect">
+            <a:avLst/>
+          </a:prstGeom>
+          <a:noFill/>
+        </p:spPr>
+        <p:txBody>
+          <a:bodyPr wrap="none" rtlCol="0">
+            <a:spAutoFit/>
+          </a:bodyPr>
+          <a:lstStyle/>
+          <a:p>
+            <a:pPr algn="ctr"/>
+            <a:r>
+              <a:rPr lang="en-US" sz="1100" dirty="0">
+                <a:latin typeface="Segoe UI" panose="020B0502040204020203" pitchFamily="34" charset="0"/>
+                <a:cs typeface="Segoe UI" panose="020B0502040204020203" pitchFamily="34" charset="0"/>
+              </a:rPr>
+              <a:t>AO2</a:t>
+            </a:r>
+          </a:p>
+          <a:p>
+            <a:pPr algn="ctr"/>
+            <a:r>
+              <a:rPr lang="en-US" sz="1100" dirty="0">
+                <a:latin typeface="Segoe UI" panose="020B0502040204020203" pitchFamily="34" charset="0"/>
+                <a:cs typeface="Segoe UI" panose="020B0502040204020203" pitchFamily="34" charset="0"/>
+              </a:rPr>
+              <a:t>(Gate)</a:t>
+            </a:r>
+          </a:p>
+        </p:txBody>
+      </p:sp>
+      <p:grpSp>
+        <p:nvGrpSpPr>
+          <p:cNvPr id="84" name="Group 83">
+            <a:extLst>
+              <a:ext uri="{FF2B5EF4-FFF2-40B4-BE49-F238E27FC236}">
+                <a16:creationId xmlns:a16="http://schemas.microsoft.com/office/drawing/2014/main" id="{6122CE9E-BBCD-4192-9E64-6F18D79AEC9F}"/>
+              </a:ext>
+            </a:extLst>
+          </p:cNvPr>
+          <p:cNvGrpSpPr/>
+          <p:nvPr/>
+        </p:nvGrpSpPr>
+        <p:grpSpPr>
+          <a:xfrm>
+            <a:off x="3357203" y="1170028"/>
+            <a:ext cx="2577379" cy="858845"/>
+            <a:chOff x="861282" y="1745569"/>
+            <a:chExt cx="10469436" cy="3488670"/>
+          </a:xfrm>
+        </p:grpSpPr>
+        <p:pic>
+          <p:nvPicPr>
+            <p:cNvPr id="88" name="Picture 87">
+              <a:extLst>
+                <a:ext uri="{FF2B5EF4-FFF2-40B4-BE49-F238E27FC236}">
+                  <a16:creationId xmlns:a16="http://schemas.microsoft.com/office/drawing/2014/main" id="{4525D9F7-9192-49CD-BD0E-2B5927311005}"/>
+                </a:ext>
+              </a:extLst>
+            </p:cNvPr>
+            <p:cNvPicPr>
+              <a:picLocks noChangeAspect="1"/>
+            </p:cNvPicPr>
+            <p:nvPr/>
+          </p:nvPicPr>
+          <p:blipFill rotWithShape="1">
+            <a:blip r:embed="rId2">
+              <a:extLst>
+                <a:ext uri="{28A0092B-C50C-407E-A947-70E740481C1C}">
+                  <a14:useLocalDpi xmlns:a14="http://schemas.microsoft.com/office/drawing/2010/main" val="0"/>
+                </a:ext>
+              </a:extLst>
+            </a:blip>
+            <a:srcRect l="50906" t="3400"/>
+            <a:stretch/>
+          </p:blipFill>
+          <p:spPr>
+            <a:xfrm>
+              <a:off x="6190814" y="1746503"/>
+              <a:ext cx="5139904" cy="3487736"/>
+            </a:xfrm>
+            <a:prstGeom prst="rect">
+              <a:avLst/>
+            </a:prstGeom>
+          </p:spPr>
+        </p:pic>
+        <p:sp>
+          <p:nvSpPr>
+            <p:cNvPr id="89" name="Rectangle 88">
+              <a:extLst>
+                <a:ext uri="{FF2B5EF4-FFF2-40B4-BE49-F238E27FC236}">
+                  <a16:creationId xmlns:a16="http://schemas.microsoft.com/office/drawing/2014/main" id="{94111BD8-5E01-4F67-A499-6BBC012CD4DE}"/>
+                </a:ext>
+              </a:extLst>
+            </p:cNvPr>
+            <p:cNvSpPr/>
+            <p:nvPr/>
+          </p:nvSpPr>
+          <p:spPr>
+            <a:xfrm>
+              <a:off x="861282" y="1746504"/>
+              <a:ext cx="272574" cy="246888"/>
+            </a:xfrm>
+            <a:prstGeom prst="rect">
+              <a:avLst/>
+            </a:prstGeom>
+            <a:ln>
+              <a:noFill/>
+            </a:ln>
+          </p:spPr>
+          <p:style>
+            <a:lnRef idx="2">
+              <a:schemeClr val="accent1"/>
+            </a:lnRef>
+            <a:fillRef idx="1">
+              <a:schemeClr val="lt1"/>
+            </a:fillRef>
+            <a:effectRef idx="0">
+              <a:schemeClr val="accent1"/>
+            </a:effectRef>
+            <a:fontRef idx="minor">
+              <a:schemeClr val="dk1"/>
+            </a:fontRef>
+          </p:style>
+          <p:txBody>
+            <a:bodyPr rtlCol="0" anchor="ctr"/>
+            <a:lstStyle/>
+            <a:p>
+              <a:pPr algn="ctr"/>
+              <a:endParaRPr lang="en-US"/>
+            </a:p>
+          </p:txBody>
+        </p:sp>
+        <p:sp>
+          <p:nvSpPr>
+            <p:cNvPr id="90" name="Rectangle 89">
+              <a:extLst>
+                <a:ext uri="{FF2B5EF4-FFF2-40B4-BE49-F238E27FC236}">
+                  <a16:creationId xmlns:a16="http://schemas.microsoft.com/office/drawing/2014/main" id="{8472F6FB-8FCF-4AB1-AE79-543EFDDDF70F}"/>
+                </a:ext>
+              </a:extLst>
+            </p:cNvPr>
+            <p:cNvSpPr/>
+            <p:nvPr/>
+          </p:nvSpPr>
+          <p:spPr>
+            <a:xfrm>
+              <a:off x="5918239" y="1746504"/>
+              <a:ext cx="272574" cy="246888"/>
+            </a:xfrm>
+            <a:prstGeom prst="rect">
+              <a:avLst/>
+            </a:prstGeom>
+            <a:ln>
+              <a:noFill/>
+            </a:ln>
+          </p:spPr>
+          <p:style>
+            <a:lnRef idx="2">
+              <a:schemeClr val="accent1"/>
+            </a:lnRef>
+            <a:fillRef idx="1">
+              <a:schemeClr val="lt1"/>
+            </a:fillRef>
+            <a:effectRef idx="0">
+              <a:schemeClr val="accent1"/>
+            </a:effectRef>
+            <a:fontRef idx="minor">
+              <a:schemeClr val="dk1"/>
+            </a:fontRef>
+          </p:style>
+          <p:txBody>
+            <a:bodyPr rtlCol="0" anchor="ctr"/>
+            <a:lstStyle/>
+            <a:p>
+              <a:pPr algn="ctr"/>
+              <a:endParaRPr lang="en-US"/>
+            </a:p>
+          </p:txBody>
+        </p:sp>
+        <p:sp>
+          <p:nvSpPr>
+            <p:cNvPr id="91" name="Rectangle 90">
+              <a:extLst>
+                <a:ext uri="{FF2B5EF4-FFF2-40B4-BE49-F238E27FC236}">
+                  <a16:creationId xmlns:a16="http://schemas.microsoft.com/office/drawing/2014/main" id="{2EA0A357-665C-4C7A-ACC0-1BD6C4909117}"/>
+                </a:ext>
+              </a:extLst>
+            </p:cNvPr>
+            <p:cNvSpPr/>
+            <p:nvPr/>
+          </p:nvSpPr>
+          <p:spPr>
+            <a:xfrm>
+              <a:off x="8617052" y="1745569"/>
+              <a:ext cx="272574" cy="246888"/>
+            </a:xfrm>
+            <a:prstGeom prst="rect">
+              <a:avLst/>
+            </a:prstGeom>
+            <a:ln>
+              <a:noFill/>
+            </a:ln>
+          </p:spPr>
+          <p:style>
+            <a:lnRef idx="2">
+              <a:schemeClr val="accent1"/>
+            </a:lnRef>
+            <a:fillRef idx="1">
+              <a:schemeClr val="lt1"/>
+            </a:fillRef>
+            <a:effectRef idx="0">
+              <a:schemeClr val="accent1"/>
+            </a:effectRef>
+            <a:fontRef idx="minor">
+              <a:schemeClr val="dk1"/>
+            </a:fontRef>
+          </p:style>
+          <p:txBody>
+            <a:bodyPr rtlCol="0" anchor="ctr"/>
+            <a:lstStyle/>
+            <a:p>
+              <a:pPr algn="ctr"/>
+              <a:endParaRPr lang="en-US"/>
+            </a:p>
+          </p:txBody>
+        </p:sp>
+      </p:grpSp>
+      <p:cxnSp>
+        <p:nvCxnSpPr>
+          <p:cNvPr id="95" name="Straight Connector 94">
+            <a:extLst>
+              <a:ext uri="{FF2B5EF4-FFF2-40B4-BE49-F238E27FC236}">
+                <a16:creationId xmlns:a16="http://schemas.microsoft.com/office/drawing/2014/main" id="{F77B872E-E08C-45BF-9107-548A56C68E9D}"/>
+              </a:ext>
+            </a:extLst>
+          </p:cNvPr>
+          <p:cNvCxnSpPr>
+            <a:cxnSpLocks/>
+            <a:stCxn id="47" idx="3"/>
+          </p:cNvCxnSpPr>
+          <p:nvPr/>
+        </p:nvCxnSpPr>
+        <p:spPr>
+          <a:xfrm>
+            <a:off x="2139165" y="1784750"/>
+            <a:ext cx="288335" cy="0"/>
+          </a:xfrm>
+          <a:prstGeom prst="line">
+            <a:avLst/>
+          </a:prstGeom>
+          <a:ln w="28575">
+            <a:headEnd type="none" w="med" len="med"/>
+            <a:tailEnd type="triangle" w="med" len="med"/>
+          </a:ln>
+        </p:spPr>
+        <p:style>
+          <a:lnRef idx="2">
+            <a:schemeClr val="accent6">
+              <a:shade val="50000"/>
+            </a:schemeClr>
+          </a:lnRef>
+          <a:fillRef idx="1">
+            <a:schemeClr val="accent6"/>
+          </a:fillRef>
+          <a:effectRef idx="0">
+            <a:schemeClr val="accent6"/>
+          </a:effectRef>
+          <a:fontRef idx="minor">
+            <a:schemeClr val="lt1"/>
+          </a:fontRef>
+        </p:style>
+      </p:cxnSp>
+      <p:cxnSp>
+        <p:nvCxnSpPr>
+          <p:cNvPr id="96" name="Straight Connector 95">
+            <a:extLst>
+              <a:ext uri="{FF2B5EF4-FFF2-40B4-BE49-F238E27FC236}">
+                <a16:creationId xmlns:a16="http://schemas.microsoft.com/office/drawing/2014/main" id="{525BA963-4D48-4E18-AE28-0159FEAC9764}"/>
+              </a:ext>
+            </a:extLst>
+          </p:cNvPr>
+          <p:cNvCxnSpPr>
+            <a:cxnSpLocks/>
+            <a:endCxn id="81" idx="1"/>
+          </p:cNvCxnSpPr>
+          <p:nvPr/>
+        </p:nvCxnSpPr>
+        <p:spPr>
+          <a:xfrm>
+            <a:off x="3520096" y="1793439"/>
+            <a:ext cx="339933" cy="0"/>
+          </a:xfrm>
+          <a:prstGeom prst="line">
+            <a:avLst/>
+          </a:prstGeom>
+          <a:ln w="28575">
+            <a:headEnd type="none" w="med" len="med"/>
+            <a:tailEnd type="triangle" w="med" len="med"/>
+          </a:ln>
+        </p:spPr>
+        <p:style>
+          <a:lnRef idx="2">
+            <a:schemeClr val="accent6">
+              <a:shade val="50000"/>
+            </a:schemeClr>
+          </a:lnRef>
+          <a:fillRef idx="1">
+            <a:schemeClr val="accent6"/>
+          </a:fillRef>
+          <a:effectRef idx="0">
+            <a:schemeClr val="accent6"/>
+          </a:effectRef>
+          <a:fontRef idx="minor">
+            <a:schemeClr val="lt1"/>
+          </a:fontRef>
+        </p:style>
+      </p:cxnSp>
+      <p:cxnSp>
+        <p:nvCxnSpPr>
+          <p:cNvPr id="98" name="Straight Connector 97">
+            <a:extLst>
+              <a:ext uri="{FF2B5EF4-FFF2-40B4-BE49-F238E27FC236}">
+                <a16:creationId xmlns:a16="http://schemas.microsoft.com/office/drawing/2014/main" id="{EE61093E-EBA5-4710-8F2E-8210D27D9A88}"/>
+              </a:ext>
+            </a:extLst>
+          </p:cNvPr>
+          <p:cNvCxnSpPr>
+            <a:cxnSpLocks/>
+          </p:cNvCxnSpPr>
+          <p:nvPr/>
+        </p:nvCxnSpPr>
+        <p:spPr>
+          <a:xfrm>
+            <a:off x="2987675" y="1294385"/>
+            <a:ext cx="0" cy="283610"/>
+          </a:xfrm>
+          <a:prstGeom prst="line">
+            <a:avLst/>
+          </a:prstGeom>
+          <a:ln w="28575">
+            <a:headEnd type="none" w="med" len="med"/>
+            <a:tailEnd type="triangle" w="med" len="med"/>
+          </a:ln>
+        </p:spPr>
+        <p:style>
+          <a:lnRef idx="2">
+            <a:schemeClr val="accent6">
+              <a:shade val="50000"/>
+            </a:schemeClr>
+          </a:lnRef>
+          <a:fillRef idx="1">
+            <a:schemeClr val="accent6"/>
+          </a:fillRef>
+          <a:effectRef idx="0">
+            <a:schemeClr val="accent6"/>
+          </a:effectRef>
+          <a:fontRef idx="minor">
+            <a:schemeClr val="lt1"/>
+          </a:fontRef>
+        </p:style>
+      </p:cxnSp>
+      <p:sp>
+        <p:nvSpPr>
+          <p:cNvPr id="101" name="TextBox 100">
+            <a:extLst>
+              <a:ext uri="{FF2B5EF4-FFF2-40B4-BE49-F238E27FC236}">
+                <a16:creationId xmlns:a16="http://schemas.microsoft.com/office/drawing/2014/main" id="{9F616C6E-6297-4AE4-9BF3-8BFA1EF5F98F}"/>
+              </a:ext>
+            </a:extLst>
+          </p:cNvPr>
+          <p:cNvSpPr txBox="1"/>
+          <p:nvPr/>
+        </p:nvSpPr>
+        <p:spPr>
+          <a:xfrm>
+            <a:off x="2835414" y="3663935"/>
+            <a:ext cx="429926" cy="246221"/>
+          </a:xfrm>
+          <a:prstGeom prst="rect">
+            <a:avLst/>
+          </a:prstGeom>
+          <a:noFill/>
+        </p:spPr>
+        <p:txBody>
+          <a:bodyPr wrap="none" rtlCol="0">
+            <a:spAutoFit/>
+          </a:bodyPr>
+          <a:lstStyle/>
+          <a:p>
+            <a:pPr algn="ctr"/>
+            <a:r>
+              <a:rPr lang="en-US" sz="1000" dirty="0">
+                <a:latin typeface="Segoe UI" panose="020B0502040204020203" pitchFamily="34" charset="0"/>
+                <a:cs typeface="Segoe UI" panose="020B0502040204020203" pitchFamily="34" charset="0"/>
+              </a:rPr>
+              <a:t>DUT</a:t>
+            </a:r>
+          </a:p>
+        </p:txBody>
+      </p:sp>
+      <p:cxnSp>
+        <p:nvCxnSpPr>
+          <p:cNvPr id="62" name="Straight Connector 61">
+            <a:extLst>
+              <a:ext uri="{FF2B5EF4-FFF2-40B4-BE49-F238E27FC236}">
+                <a16:creationId xmlns:a16="http://schemas.microsoft.com/office/drawing/2014/main" id="{8D59A7FA-07C0-4F56-A5CF-7EB715FC74E8}"/>
+              </a:ext>
+            </a:extLst>
+          </p:cNvPr>
+          <p:cNvCxnSpPr>
+            <a:cxnSpLocks/>
+          </p:cNvCxnSpPr>
+          <p:nvPr/>
+        </p:nvCxnSpPr>
+        <p:spPr>
+          <a:xfrm flipH="1" flipV="1">
+            <a:off x="1362075" y="2045494"/>
+            <a:ext cx="1253026" cy="971368"/>
+          </a:xfrm>
+          <a:prstGeom prst="line">
+            <a:avLst/>
+          </a:prstGeom>
+          <a:ln w="28575">
+            <a:solidFill>
+              <a:schemeClr val="accent6">
+                <a:lumMod val="75000"/>
+              </a:schemeClr>
+            </a:solidFill>
+          </a:ln>
+        </p:spPr>
+        <p:style>
+          <a:lnRef idx="1">
+            <a:schemeClr val="accent1"/>
+          </a:lnRef>
+          <a:fillRef idx="0">
+            <a:schemeClr val="accent1"/>
+          </a:fillRef>
+          <a:effectRef idx="0">
+            <a:schemeClr val="accent1"/>
+          </a:effectRef>
+          <a:fontRef idx="minor">
+            <a:schemeClr val="tx1"/>
+          </a:fontRef>
+        </p:style>
+      </p:cxnSp>
+      <p:cxnSp>
+        <p:nvCxnSpPr>
+          <p:cNvPr id="106" name="Straight Connector 105">
+            <a:extLst>
+              <a:ext uri="{FF2B5EF4-FFF2-40B4-BE49-F238E27FC236}">
+                <a16:creationId xmlns:a16="http://schemas.microsoft.com/office/drawing/2014/main" id="{CB072A59-9009-4CEB-9EC0-0C62CA8340C9}"/>
+              </a:ext>
+            </a:extLst>
+          </p:cNvPr>
+          <p:cNvCxnSpPr>
+            <a:cxnSpLocks/>
+          </p:cNvCxnSpPr>
+          <p:nvPr/>
+        </p:nvCxnSpPr>
+        <p:spPr>
+          <a:xfrm flipV="1">
+            <a:off x="3441011" y="2040312"/>
+            <a:ext cx="982300" cy="976549"/>
+          </a:xfrm>
+          <a:prstGeom prst="line">
+            <a:avLst/>
+          </a:prstGeom>
+          <a:ln w="28575">
+            <a:solidFill>
+              <a:schemeClr val="accent6">
+                <a:lumMod val="75000"/>
+              </a:schemeClr>
+            </a:solidFill>
+          </a:ln>
+        </p:spPr>
+        <p:style>
+          <a:lnRef idx="1">
+            <a:schemeClr val="accent1"/>
+          </a:lnRef>
+          <a:fillRef idx="0">
+            <a:schemeClr val="accent1"/>
+          </a:fillRef>
+          <a:effectRef idx="0">
+            <a:schemeClr val="accent1"/>
+          </a:effectRef>
+          <a:fontRef idx="minor">
+            <a:schemeClr val="tx1"/>
+          </a:fontRef>
+        </p:style>
+      </p:cxnSp>
+      <p:pic>
+        <p:nvPicPr>
+          <p:cNvPr id="68" name="Picture 67">
+            <a:extLst>
+              <a:ext uri="{FF2B5EF4-FFF2-40B4-BE49-F238E27FC236}">
+                <a16:creationId xmlns:a16="http://schemas.microsoft.com/office/drawing/2014/main" id="{F7DFA8FE-5B3A-492C-BCD1-DAF2666B9EEB}"/>
+              </a:ext>
+            </a:extLst>
+          </p:cNvPr>
+          <p:cNvPicPr>
+            <a:picLocks noChangeAspect="1"/>
+          </p:cNvPicPr>
+          <p:nvPr/>
+        </p:nvPicPr>
+        <p:blipFill>
+          <a:blip r:embed="rId3"/>
+          <a:stretch>
+            <a:fillRect/>
+          </a:stretch>
+        </p:blipFill>
+        <p:spPr>
+          <a:xfrm>
+            <a:off x="7258228" y="235709"/>
+            <a:ext cx="4459605" cy="1772407"/>
+          </a:xfrm>
+          <a:prstGeom prst="rect">
+            <a:avLst/>
+          </a:prstGeom>
+          <a:ln>
+            <a:solidFill>
+              <a:schemeClr val="accent5"/>
+            </a:solidFill>
+          </a:ln>
+        </p:spPr>
+      </p:pic>
+      <p:cxnSp>
+        <p:nvCxnSpPr>
+          <p:cNvPr id="70" name="Connector: Elbow 69">
+            <a:extLst>
+              <a:ext uri="{FF2B5EF4-FFF2-40B4-BE49-F238E27FC236}">
+                <a16:creationId xmlns:a16="http://schemas.microsoft.com/office/drawing/2014/main" id="{5EFBF5E5-EEB0-4CB0-845C-03DBDDEF5193}"/>
+              </a:ext>
+            </a:extLst>
+          </p:cNvPr>
+          <p:cNvCxnSpPr>
+            <a:stCxn id="31" idx="3"/>
+            <a:endCxn id="68" idx="2"/>
+          </p:cNvCxnSpPr>
+          <p:nvPr/>
+        </p:nvCxnSpPr>
+        <p:spPr>
+          <a:xfrm flipV="1">
+            <a:off x="8648340" y="2008116"/>
+            <a:ext cx="839691" cy="1184492"/>
+          </a:xfrm>
+          <a:prstGeom prst="bentConnector2">
+            <a:avLst/>
+          </a:prstGeom>
+          <a:ln>
+            <a:solidFill>
+              <a:schemeClr val="accent5"/>
+            </a:solidFill>
+            <a:tailEnd type="triangle"/>
+          </a:ln>
+        </p:spPr>
+        <p:style>
+          <a:lnRef idx="1">
+            <a:schemeClr val="accent1"/>
+          </a:lnRef>
+          <a:fillRef idx="0">
+            <a:schemeClr val="accent1"/>
+          </a:fillRef>
+          <a:effectRef idx="0">
+            <a:schemeClr val="accent1"/>
+          </a:effectRef>
+          <a:fontRef idx="minor">
+            <a:schemeClr val="tx1"/>
+          </a:fontRef>
+        </p:style>
+      </p:cxnSp>
+      <p:sp>
+        <p:nvSpPr>
+          <p:cNvPr id="76" name="TextBox 75">
+            <a:extLst>
+              <a:ext uri="{FF2B5EF4-FFF2-40B4-BE49-F238E27FC236}">
+                <a16:creationId xmlns:a16="http://schemas.microsoft.com/office/drawing/2014/main" id="{D33A1EE6-C615-4285-93FC-2919D6E5ED2A}"/>
+              </a:ext>
+            </a:extLst>
+          </p:cNvPr>
+          <p:cNvSpPr txBox="1"/>
+          <p:nvPr/>
+        </p:nvSpPr>
+        <p:spPr>
+          <a:xfrm>
+            <a:off x="10187606" y="2046018"/>
+            <a:ext cx="1530227" cy="1938992"/>
+          </a:xfrm>
+          <a:prstGeom prst="rect">
+            <a:avLst/>
+          </a:prstGeom>
+          <a:noFill/>
+        </p:spPr>
+        <p:txBody>
+          <a:bodyPr wrap="none" rtlCol="0">
+            <a:spAutoFit/>
+          </a:bodyPr>
+          <a:lstStyle/>
+          <a:p>
+            <a:r>
+              <a:rPr lang="en-US" sz="1200" dirty="0">
+                <a:latin typeface="Segoe UI" panose="020B0502040204020203" pitchFamily="34" charset="0"/>
+                <a:cs typeface="Segoe UI" panose="020B0502040204020203" pitchFamily="34" charset="0"/>
+              </a:rPr>
+              <a:t>AO1:</a:t>
+            </a:r>
+          </a:p>
+          <a:p>
+            <a:pPr marL="285750" indent="-285750">
+              <a:buFontTx/>
+              <a:buChar char="-"/>
+            </a:pPr>
+            <a:r>
+              <a:rPr lang="en-US" sz="1200" dirty="0">
+                <a:latin typeface="Segoe UI" panose="020B0502040204020203" pitchFamily="34" charset="0"/>
+                <a:cs typeface="Segoe UI" panose="020B0502040204020203" pitchFamily="34" charset="0"/>
+              </a:rPr>
+              <a:t>Amp = 10 mV</a:t>
+            </a:r>
+          </a:p>
+          <a:p>
+            <a:pPr marL="285750" indent="-285750">
+              <a:buFontTx/>
+              <a:buChar char="-"/>
+            </a:pPr>
+            <a:r>
+              <a:rPr lang="en-US" sz="1200" dirty="0">
+                <a:latin typeface="Segoe UI" panose="020B0502040204020203" pitchFamily="34" charset="0"/>
+                <a:cs typeface="Segoe UI" panose="020B0502040204020203" pitchFamily="34" charset="0"/>
+              </a:rPr>
+              <a:t>f = 13 Hz</a:t>
+            </a:r>
+          </a:p>
+          <a:p>
+            <a:r>
+              <a:rPr lang="en-US" sz="1200" dirty="0">
+                <a:latin typeface="Segoe UI" panose="020B0502040204020203" pitchFamily="34" charset="0"/>
+                <a:cs typeface="Segoe UI" panose="020B0502040204020203" pitchFamily="34" charset="0"/>
+              </a:rPr>
+              <a:t>Sweep AO2:</a:t>
+            </a:r>
+          </a:p>
+          <a:p>
+            <a:pPr marL="285750" indent="-285750">
+              <a:buFontTx/>
+              <a:buChar char="-"/>
+            </a:pPr>
+            <a:r>
+              <a:rPr lang="en-US" sz="1200" dirty="0">
+                <a:latin typeface="Segoe UI" panose="020B0502040204020203" pitchFamily="34" charset="0"/>
+                <a:cs typeface="Segoe UI" panose="020B0502040204020203" pitchFamily="34" charset="0"/>
+              </a:rPr>
+              <a:t>0 – 100 mV, 20s</a:t>
+            </a:r>
+          </a:p>
+          <a:p>
+            <a:r>
+              <a:rPr lang="en-US" sz="1200" dirty="0">
+                <a:latin typeface="Segoe UI" panose="020B0502040204020203" pitchFamily="34" charset="0"/>
+                <a:cs typeface="Segoe UI" panose="020B0502040204020203" pitchFamily="34" charset="0"/>
+              </a:rPr>
+              <a:t>AI1:</a:t>
+            </a:r>
+          </a:p>
+          <a:p>
+            <a:pPr marL="285750" indent="-285750">
+              <a:buFontTx/>
+              <a:buChar char="-"/>
+            </a:pPr>
+            <a:r>
+              <a:rPr lang="en-US" sz="1200" dirty="0">
+                <a:latin typeface="Segoe UI" panose="020B0502040204020203" pitchFamily="34" charset="0"/>
+                <a:cs typeface="Segoe UI" panose="020B0502040204020203" pitchFamily="34" charset="0"/>
+              </a:rPr>
+              <a:t>Gain = 50,000</a:t>
+            </a:r>
+          </a:p>
+          <a:p>
+            <a:r>
+              <a:rPr lang="en-US" sz="1200" dirty="0">
+                <a:latin typeface="Segoe UI" panose="020B0502040204020203" pitchFamily="34" charset="0"/>
+                <a:cs typeface="Segoe UI" panose="020B0502040204020203" pitchFamily="34" charset="0"/>
+              </a:rPr>
+              <a:t>REF:</a:t>
+            </a:r>
+          </a:p>
+          <a:p>
+            <a:pPr marL="171450" indent="-171450">
+              <a:buFontTx/>
+              <a:buChar char="-"/>
+            </a:pPr>
+            <a:r>
+              <a:rPr lang="en-US" sz="1200" dirty="0">
+                <a:latin typeface="Segoe UI" panose="020B0502040204020203" pitchFamily="34" charset="0"/>
+                <a:cs typeface="Segoe UI" panose="020B0502040204020203" pitchFamily="34" charset="0"/>
+              </a:rPr>
+              <a:t>f = 13 Hz</a:t>
+            </a:r>
+          </a:p>
+          <a:p>
+            <a:pPr marL="171450" indent="-171450">
+              <a:buFontTx/>
+              <a:buChar char="-"/>
+            </a:pPr>
+            <a:r>
+              <a:rPr lang="en-US" sz="1200" dirty="0">
+                <a:latin typeface="Segoe UI" panose="020B0502040204020203" pitchFamily="34" charset="0"/>
+                <a:cs typeface="Segoe UI" panose="020B0502040204020203" pitchFamily="34" charset="0"/>
+              </a:rPr>
+              <a:t>TC = 100 </a:t>
+            </a:r>
+            <a:r>
+              <a:rPr lang="en-US" sz="1200" dirty="0" err="1">
+                <a:latin typeface="Segoe UI" panose="020B0502040204020203" pitchFamily="34" charset="0"/>
+                <a:cs typeface="Segoe UI" panose="020B0502040204020203" pitchFamily="34" charset="0"/>
+              </a:rPr>
+              <a:t>ms</a:t>
+            </a:r>
+            <a:endParaRPr lang="en-US" sz="1200" dirty="0">
+              <a:latin typeface="Segoe UI" panose="020B0502040204020203" pitchFamily="34" charset="0"/>
+              <a:cs typeface="Segoe UI" panose="020B0502040204020203" pitchFamily="34" charset="0"/>
+            </a:endParaRPr>
+          </a:p>
+        </p:txBody>
+      </p:sp>
+    </p:spTree>
+    <p:extLst>
+      <p:ext uri="{BB962C8B-B14F-4D97-AF65-F5344CB8AC3E}">
+        <p14:creationId xmlns:p14="http://schemas.microsoft.com/office/powerpoint/2010/main" val="1549289174"/>
+      </p:ext>
+    </p:extLst>
+  </p:cSld>
+  <p:clrMapOvr>
+    <a:masterClrMapping/>
+  </p:clrMapOvr>
+</p:sld>
+</file>
+
 <file path=ppt/theme/theme1.xml><?xml version="1.0" encoding="utf-8"?>
 <a:theme xmlns:a="http://schemas.openxmlformats.org/drawingml/2006/main" name="Office Theme">
   <a:themeElements>

</xml_diff>

<commit_message>
move subVIs - DAQ/Lockin to DAQ SMO config.vi
</commit_message>
<xml_diff>
--- a/documentation/Lockin.pptx
+++ b/documentation/Lockin.pptx
@@ -274,7 +274,7 @@
           <a:p>
             <a:fld id="{ECAE5561-7ABB-4465-9542-9FA5C0A277D0}" type="datetimeFigureOut">
               <a:rPr lang="en-US" smtClean="0"/>
-              <a:t>3/4/2020</a:t>
+              <a:t>7/14/2020</a:t>
             </a:fld>
             <a:endParaRPr lang="en-US"/>
           </a:p>
@@ -472,7 +472,7 @@
           <a:p>
             <a:fld id="{ECAE5561-7ABB-4465-9542-9FA5C0A277D0}" type="datetimeFigureOut">
               <a:rPr lang="en-US" smtClean="0"/>
-              <a:t>3/4/2020</a:t>
+              <a:t>7/14/2020</a:t>
             </a:fld>
             <a:endParaRPr lang="en-US"/>
           </a:p>
@@ -680,7 +680,7 @@
           <a:p>
             <a:fld id="{ECAE5561-7ABB-4465-9542-9FA5C0A277D0}" type="datetimeFigureOut">
               <a:rPr lang="en-US" smtClean="0"/>
-              <a:t>3/4/2020</a:t>
+              <a:t>7/14/2020</a:t>
             </a:fld>
             <a:endParaRPr lang="en-US"/>
           </a:p>
@@ -878,7 +878,7 @@
           <a:p>
             <a:fld id="{ECAE5561-7ABB-4465-9542-9FA5C0A277D0}" type="datetimeFigureOut">
               <a:rPr lang="en-US" smtClean="0"/>
-              <a:t>3/4/2020</a:t>
+              <a:t>7/14/2020</a:t>
             </a:fld>
             <a:endParaRPr lang="en-US"/>
           </a:p>
@@ -1153,7 +1153,7 @@
           <a:p>
             <a:fld id="{ECAE5561-7ABB-4465-9542-9FA5C0A277D0}" type="datetimeFigureOut">
               <a:rPr lang="en-US" smtClean="0"/>
-              <a:t>3/4/2020</a:t>
+              <a:t>7/14/2020</a:t>
             </a:fld>
             <a:endParaRPr lang="en-US"/>
           </a:p>
@@ -1418,7 +1418,7 @@
           <a:p>
             <a:fld id="{ECAE5561-7ABB-4465-9542-9FA5C0A277D0}" type="datetimeFigureOut">
               <a:rPr lang="en-US" smtClean="0"/>
-              <a:t>3/4/2020</a:t>
+              <a:t>7/14/2020</a:t>
             </a:fld>
             <a:endParaRPr lang="en-US"/>
           </a:p>
@@ -1830,7 +1830,7 @@
           <a:p>
             <a:fld id="{ECAE5561-7ABB-4465-9542-9FA5C0A277D0}" type="datetimeFigureOut">
               <a:rPr lang="en-US" smtClean="0"/>
-              <a:t>3/4/2020</a:t>
+              <a:t>7/14/2020</a:t>
             </a:fld>
             <a:endParaRPr lang="en-US"/>
           </a:p>
@@ -1971,7 +1971,7 @@
           <a:p>
             <a:fld id="{ECAE5561-7ABB-4465-9542-9FA5C0A277D0}" type="datetimeFigureOut">
               <a:rPr lang="en-US" smtClean="0"/>
-              <a:t>3/4/2020</a:t>
+              <a:t>7/14/2020</a:t>
             </a:fld>
             <a:endParaRPr lang="en-US"/>
           </a:p>
@@ -2084,7 +2084,7 @@
           <a:p>
             <a:fld id="{ECAE5561-7ABB-4465-9542-9FA5C0A277D0}" type="datetimeFigureOut">
               <a:rPr lang="en-US" smtClean="0"/>
-              <a:t>3/4/2020</a:t>
+              <a:t>7/14/2020</a:t>
             </a:fld>
             <a:endParaRPr lang="en-US"/>
           </a:p>
@@ -2395,7 +2395,7 @@
           <a:p>
             <a:fld id="{ECAE5561-7ABB-4465-9542-9FA5C0A277D0}" type="datetimeFigureOut">
               <a:rPr lang="en-US" smtClean="0"/>
-              <a:t>3/4/2020</a:t>
+              <a:t>7/14/2020</a:t>
             </a:fld>
             <a:endParaRPr lang="en-US"/>
           </a:p>
@@ -2683,7 +2683,7 @@
           <a:p>
             <a:fld id="{ECAE5561-7ABB-4465-9542-9FA5C0A277D0}" type="datetimeFigureOut">
               <a:rPr lang="en-US" smtClean="0"/>
-              <a:t>3/4/2020</a:t>
+              <a:t>7/14/2020</a:t>
             </a:fld>
             <a:endParaRPr lang="en-US"/>
           </a:p>
@@ -2924,7 +2924,7 @@
           <a:p>
             <a:fld id="{ECAE5561-7ABB-4465-9542-9FA5C0A277D0}" type="datetimeFigureOut">
               <a:rPr lang="en-US" smtClean="0"/>
-              <a:t>3/4/2020</a:t>
+              <a:t>7/14/2020</a:t>
             </a:fld>
             <a:endParaRPr lang="en-US"/>
           </a:p>
@@ -3409,10 +3409,10 @@
       </p:grpSpPr>
       <p:sp>
         <p:nvSpPr>
-          <p:cNvPr id="165" name="Rectangle 164">
-            <a:extLst>
-              <a:ext uri="{FF2B5EF4-FFF2-40B4-BE49-F238E27FC236}">
-                <a16:creationId xmlns:a16="http://schemas.microsoft.com/office/drawing/2014/main" id="{E68D68DA-7444-4ED1-9F6A-64C6D256B57E}"/>
+          <p:cNvPr id="92" name="Rectangle 91">
+            <a:extLst>
+              <a:ext uri="{FF2B5EF4-FFF2-40B4-BE49-F238E27FC236}">
+                <a16:creationId xmlns:a16="http://schemas.microsoft.com/office/drawing/2014/main" id="{0D85A1C0-2C12-4A8F-95FA-D64D6E1C9888}"/>
               </a:ext>
             </a:extLst>
           </p:cNvPr>
@@ -3421,35 +3421,33 @@
         </p:nvSpPr>
         <p:spPr>
           <a:xfrm>
-            <a:off x="10717559" y="4672844"/>
-            <a:ext cx="965441" cy="351492"/>
+            <a:off x="1729704" y="2492571"/>
+            <a:ext cx="2098816" cy="2230431"/>
           </a:xfrm>
           <a:prstGeom prst="rect">
             <a:avLst/>
           </a:prstGeom>
-          <a:noFill/>
-          <a:ln w="9525" cap="flat" cmpd="sng" algn="ctr">
-            <a:solidFill>
-              <a:schemeClr val="dk1"/>
-            </a:solidFill>
-            <a:prstDash val="dash"/>
-            <a:round/>
-            <a:headEnd type="none" w="med" len="med"/>
-            <a:tailEnd type="none" w="med" len="med"/>
-          </a:ln>
+          <a:solidFill>
+            <a:schemeClr val="accent1">
+              <a:lumMod val="20000"/>
+              <a:lumOff val="80000"/>
+            </a:schemeClr>
+          </a:solidFill>
         </p:spPr>
         <p:style>
-          <a:lnRef idx="0">
-            <a:scrgbClr r="0" g="0" b="0"/>
+          <a:lnRef idx="2">
+            <a:schemeClr val="accent1">
+              <a:shade val="50000"/>
+            </a:schemeClr>
           </a:lnRef>
-          <a:fillRef idx="0">
-            <a:scrgbClr r="0" g="0" b="0"/>
+          <a:fillRef idx="1">
+            <a:schemeClr val="accent1"/>
           </a:fillRef>
           <a:effectRef idx="0">
-            <a:scrgbClr r="0" g="0" b="0"/>
+            <a:schemeClr val="accent1"/>
           </a:effectRef>
           <a:fontRef idx="minor">
-            <a:schemeClr val="dk1"/>
+            <a:schemeClr val="lt1"/>
           </a:fontRef>
         </p:style>
         <p:txBody>
@@ -3457,10 +3455,111 @@
           <a:lstStyle/>
           <a:p>
             <a:pPr algn="ctr"/>
-            <a:endParaRPr lang="en-US" dirty="0">
-              <a:latin typeface="Segoe UI" panose="020B0502040204020203" pitchFamily="34" charset="0"/>
-              <a:cs typeface="Segoe UI" panose="020B0502040204020203" pitchFamily="34" charset="0"/>
-            </a:endParaRPr>
+            <a:endParaRPr lang="en-US" dirty="0"/>
+          </a:p>
+        </p:txBody>
+      </p:sp>
+      <p:sp>
+        <p:nvSpPr>
+          <p:cNvPr id="94" name="Rectangle 93">
+            <a:extLst>
+              <a:ext uri="{FF2B5EF4-FFF2-40B4-BE49-F238E27FC236}">
+                <a16:creationId xmlns:a16="http://schemas.microsoft.com/office/drawing/2014/main" id="{605313EA-248E-4817-A761-1808FBAECCB9}"/>
+              </a:ext>
+            </a:extLst>
+          </p:cNvPr>
+          <p:cNvSpPr/>
+          <p:nvPr/>
+        </p:nvSpPr>
+        <p:spPr>
+          <a:xfrm>
+            <a:off x="5557277" y="2488413"/>
+            <a:ext cx="4905009" cy="2234589"/>
+          </a:xfrm>
+          <a:prstGeom prst="rect">
+            <a:avLst/>
+          </a:prstGeom>
+          <a:solidFill>
+            <a:schemeClr val="accent1">
+              <a:lumMod val="20000"/>
+              <a:lumOff val="80000"/>
+            </a:schemeClr>
+          </a:solidFill>
+        </p:spPr>
+        <p:style>
+          <a:lnRef idx="2">
+            <a:schemeClr val="accent1">
+              <a:shade val="50000"/>
+            </a:schemeClr>
+          </a:lnRef>
+          <a:fillRef idx="1">
+            <a:schemeClr val="accent1"/>
+          </a:fillRef>
+          <a:effectRef idx="0">
+            <a:schemeClr val="accent1"/>
+          </a:effectRef>
+          <a:fontRef idx="minor">
+            <a:schemeClr val="lt1"/>
+          </a:fontRef>
+        </p:style>
+        <p:txBody>
+          <a:bodyPr rtlCol="0" anchor="ctr"/>
+          <a:lstStyle/>
+          <a:p>
+            <a:pPr algn="ctr"/>
+            <a:endParaRPr lang="en-US" dirty="0"/>
+          </a:p>
+        </p:txBody>
+      </p:sp>
+      <p:sp>
+        <p:nvSpPr>
+          <p:cNvPr id="4" name="Rectangle 3">
+            <a:extLst>
+              <a:ext uri="{FF2B5EF4-FFF2-40B4-BE49-F238E27FC236}">
+                <a16:creationId xmlns:a16="http://schemas.microsoft.com/office/drawing/2014/main" id="{784C18BF-B4B5-4E96-843D-FC146A5F81D1}"/>
+              </a:ext>
+            </a:extLst>
+          </p:cNvPr>
+          <p:cNvSpPr/>
+          <p:nvPr/>
+        </p:nvSpPr>
+        <p:spPr>
+          <a:xfrm>
+            <a:off x="3935651" y="2492571"/>
+            <a:ext cx="1509967" cy="2230431"/>
+          </a:xfrm>
+          <a:prstGeom prst="rect">
+            <a:avLst/>
+          </a:prstGeom>
+          <a:solidFill>
+            <a:schemeClr val="accent6">
+              <a:lumMod val="20000"/>
+              <a:lumOff val="80000"/>
+            </a:schemeClr>
+          </a:solidFill>
+        </p:spPr>
+        <p:style>
+          <a:lnRef idx="2">
+            <a:schemeClr val="accent6">
+              <a:shade val="50000"/>
+            </a:schemeClr>
+          </a:lnRef>
+          <a:fillRef idx="1">
+            <a:schemeClr val="accent6"/>
+          </a:fillRef>
+          <a:effectRef idx="0">
+            <a:schemeClr val="accent6"/>
+          </a:effectRef>
+          <a:fontRef idx="minor">
+            <a:schemeClr val="lt1"/>
+          </a:fontRef>
+        </p:style>
+        <p:txBody>
+          <a:bodyPr rtlCol="0" anchor="ctr"/>
+          <a:lstStyle/>
+          <a:p>
+            <a:pPr algn="ctr"/>
+            <a:endParaRPr lang="en-US" dirty="0"/>
           </a:p>
         </p:txBody>
       </p:sp>
@@ -3491,8 +3590,8 @@
         </p:blipFill>
         <p:spPr>
           <a:xfrm>
-            <a:off x="332399" y="5193607"/>
-            <a:ext cx="5506064" cy="746014"/>
+            <a:off x="3379410" y="5382433"/>
+            <a:ext cx="4464666" cy="604916"/>
           </a:xfrm>
           <a:prstGeom prst="rect">
             <a:avLst/>
@@ -3526,8 +3625,8 @@
         </p:blipFill>
         <p:spPr>
           <a:xfrm>
-            <a:off x="3342968" y="38339"/>
-            <a:ext cx="5506064" cy="2357597"/>
+            <a:off x="116124" y="381429"/>
+            <a:ext cx="4464666" cy="1911690"/>
           </a:xfrm>
           <a:prstGeom prst="rect">
             <a:avLst/>
@@ -3548,8 +3647,8 @@
         </p:nvSpPr>
         <p:spPr>
           <a:xfrm>
-            <a:off x="3153447" y="5243513"/>
-            <a:ext cx="2665681" cy="666505"/>
+            <a:off x="5681333" y="5414668"/>
+            <a:ext cx="2161504" cy="540446"/>
           </a:xfrm>
           <a:prstGeom prst="rect">
             <a:avLst/>
@@ -3602,8 +3701,8 @@
         </p:nvSpPr>
         <p:spPr>
           <a:xfrm>
-            <a:off x="365972" y="5243510"/>
-            <a:ext cx="2699197" cy="666508"/>
+            <a:off x="3418562" y="5414668"/>
+            <a:ext cx="2188682" cy="540448"/>
           </a:xfrm>
           <a:prstGeom prst="rect">
             <a:avLst/>
@@ -3654,17 +3753,19 @@
           <p:cNvCxnSpPr>
             <a:cxnSpLocks/>
             <a:stCxn id="20" idx="0"/>
-            <a:endCxn id="7" idx="1"/>
+            <a:endCxn id="7" idx="2"/>
           </p:cNvCxnSpPr>
           <p:nvPr/>
         </p:nvCxnSpPr>
         <p:spPr>
-          <a:xfrm rot="5400000" flipH="1" flipV="1">
-            <a:off x="2039568" y="1526028"/>
-            <a:ext cx="1612290" cy="994510"/>
-          </a:xfrm>
-          <a:prstGeom prst="bentConnector2">
-            <a:avLst/>
+          <a:xfrm rot="16200000" flipV="1">
+            <a:off x="2080304" y="2561273"/>
+            <a:ext cx="536309" cy="1"/>
+          </a:xfrm>
+          <a:prstGeom prst="bentConnector3">
+            <a:avLst>
+              <a:gd name="adj1" fmla="val 50000"/>
+            </a:avLst>
           </a:prstGeom>
           <a:ln>
             <a:prstDash val="dash"/>
@@ -3685,109 +3786,6 @@
           </a:fontRef>
         </p:style>
       </p:cxnSp>
-      <p:sp>
-        <p:nvSpPr>
-          <p:cNvPr id="73" name="Rectangle 72">
-            <a:extLst>
-              <a:ext uri="{FF2B5EF4-FFF2-40B4-BE49-F238E27FC236}">
-                <a16:creationId xmlns:a16="http://schemas.microsoft.com/office/drawing/2014/main" id="{F2B93FB7-96FE-4D79-9619-D9EE57C2B2FF}"/>
-              </a:ext>
-            </a:extLst>
-          </p:cNvPr>
-          <p:cNvSpPr/>
-          <p:nvPr/>
-        </p:nvSpPr>
-        <p:spPr>
-          <a:xfrm>
-            <a:off x="10672314" y="4197762"/>
-            <a:ext cx="965441" cy="351492"/>
-          </a:xfrm>
-          <a:prstGeom prst="rect">
-            <a:avLst/>
-          </a:prstGeom>
-          <a:ln w="28575"/>
-        </p:spPr>
-        <p:style>
-          <a:lnRef idx="2">
-            <a:schemeClr val="accent6">
-              <a:shade val="50000"/>
-            </a:schemeClr>
-          </a:lnRef>
-          <a:fillRef idx="1">
-            <a:schemeClr val="accent6"/>
-          </a:fillRef>
-          <a:effectRef idx="0">
-            <a:schemeClr val="accent6"/>
-          </a:effectRef>
-          <a:fontRef idx="minor">
-            <a:schemeClr val="lt1"/>
-          </a:fontRef>
-        </p:style>
-        <p:txBody>
-          <a:bodyPr rtlCol="0" anchor="ctr"/>
-          <a:lstStyle/>
-          <a:p>
-            <a:pPr algn="ctr"/>
-            <a:r>
-              <a:rPr lang="en-US" dirty="0">
-                <a:latin typeface="Segoe UI" panose="020B0502040204020203" pitchFamily="34" charset="0"/>
-                <a:cs typeface="Segoe UI" panose="020B0502040204020203" pitchFamily="34" charset="0"/>
-              </a:rPr>
-              <a:t>Analog</a:t>
-            </a:r>
-          </a:p>
-        </p:txBody>
-      </p:sp>
-      <p:sp>
-        <p:nvSpPr>
-          <p:cNvPr id="74" name="Rectangle 73">
-            <a:extLst>
-              <a:ext uri="{FF2B5EF4-FFF2-40B4-BE49-F238E27FC236}">
-                <a16:creationId xmlns:a16="http://schemas.microsoft.com/office/drawing/2014/main" id="{0E9171E7-C61B-4A0E-BF02-C30B8A0E5089}"/>
-              </a:ext>
-            </a:extLst>
-          </p:cNvPr>
-          <p:cNvSpPr/>
-          <p:nvPr/>
-        </p:nvSpPr>
-        <p:spPr>
-          <a:xfrm>
-            <a:off x="10672315" y="4715131"/>
-            <a:ext cx="965441" cy="351492"/>
-          </a:xfrm>
-          <a:prstGeom prst="rect">
-            <a:avLst/>
-          </a:prstGeom>
-        </p:spPr>
-        <p:style>
-          <a:lnRef idx="2">
-            <a:schemeClr val="dk1"/>
-          </a:lnRef>
-          <a:fillRef idx="1">
-            <a:schemeClr val="lt1"/>
-          </a:fillRef>
-          <a:effectRef idx="0">
-            <a:schemeClr val="dk1"/>
-          </a:effectRef>
-          <a:fontRef idx="minor">
-            <a:schemeClr val="dk1"/>
-          </a:fontRef>
-        </p:style>
-        <p:txBody>
-          <a:bodyPr rtlCol="0" anchor="ctr"/>
-          <a:lstStyle/>
-          <a:p>
-            <a:pPr algn="ctr"/>
-            <a:r>
-              <a:rPr lang="en-US" dirty="0">
-                <a:latin typeface="Segoe UI" panose="020B0502040204020203" pitchFamily="34" charset="0"/>
-                <a:cs typeface="Segoe UI" panose="020B0502040204020203" pitchFamily="34" charset="0"/>
-              </a:rPr>
-              <a:t>Digital</a:t>
-            </a:r>
-          </a:p>
-        </p:txBody>
-      </p:sp>
       <p:pic>
         <p:nvPicPr>
           <p:cNvPr id="87" name="Picture 86" descr="Instrument.Lockin.lvclass:Multichannel Lockin.vi">
@@ -3810,13 +3808,13 @@
               </a:ext>
             </a:extLst>
           </a:blip>
-          <a:srcRect l="1532" t="59952" r="53306" b="16071"/>
+          <a:srcRect l="1532" t="59952" r="69049" b="16071"/>
           <a:stretch/>
         </p:blipFill>
         <p:spPr>
           <a:xfrm>
-            <a:off x="6353537" y="5193607"/>
-            <a:ext cx="5506064" cy="1592825"/>
+            <a:off x="7914417" y="5376473"/>
+            <a:ext cx="2908374" cy="1291564"/>
           </a:xfrm>
           <a:prstGeom prst="rect">
             <a:avLst/>
@@ -4107,10 +4105,13 @@
           <a:lstStyle/>
           <a:p>
             <a:pPr algn="ctr"/>
-            <a:endParaRPr lang="en-US" sz="1400" dirty="0">
-              <a:latin typeface="Segoe UI" panose="020B0502040204020203" pitchFamily="34" charset="0"/>
-              <a:cs typeface="Segoe UI" panose="020B0502040204020203" pitchFamily="34" charset="0"/>
-            </a:endParaRPr>
+            <a:r>
+              <a:rPr lang="en-US" sz="1400" dirty="0">
+                <a:latin typeface="Segoe UI" panose="020B0502040204020203" pitchFamily="34" charset="0"/>
+                <a:cs typeface="Segoe UI" panose="020B0502040204020203" pitchFamily="34" charset="0"/>
+              </a:rPr>
+              <a:t>DUT</a:t>
+            </a:r>
           </a:p>
         </p:txBody>
       </p:sp>
@@ -5227,8 +5228,8 @@
         </p:nvSpPr>
         <p:spPr>
           <a:xfrm>
-            <a:off x="8503841" y="5535553"/>
-            <a:ext cx="1192609" cy="1065271"/>
+            <a:off x="9656805" y="5668529"/>
+            <a:ext cx="967044" cy="863790"/>
           </a:xfrm>
           <a:prstGeom prst="rect">
             <a:avLst/>
@@ -5281,8 +5282,8 @@
         </p:nvSpPr>
         <p:spPr>
           <a:xfrm>
-            <a:off x="6991350" y="5535553"/>
-            <a:ext cx="1512491" cy="1065271"/>
+            <a:off x="8410715" y="5668529"/>
+            <a:ext cx="1226424" cy="863790"/>
           </a:xfrm>
           <a:prstGeom prst="rect">
             <a:avLst/>
@@ -5339,12 +5340,12 @@
         </p:nvCxnSpPr>
         <p:spPr>
           <a:xfrm rot="5400000" flipH="1" flipV="1">
-            <a:off x="3519968" y="1713291"/>
-            <a:ext cx="1725823" cy="5334617"/>
+            <a:off x="4833055" y="3197536"/>
+            <a:ext cx="1896981" cy="2537285"/>
           </a:xfrm>
           <a:prstGeom prst="bentConnector3">
             <a:avLst>
-              <a:gd name="adj1" fmla="val 25164"/>
+              <a:gd name="adj1" fmla="val 22140"/>
             </a:avLst>
           </a:prstGeom>
           <a:ln>
@@ -5384,12 +5385,12 @@
         </p:nvCxnSpPr>
         <p:spPr>
           <a:xfrm rot="5400000" flipH="1" flipV="1">
-            <a:off x="5407187" y="2596788"/>
-            <a:ext cx="1725826" cy="3567625"/>
+            <a:off x="6459509" y="3820264"/>
+            <a:ext cx="1896981" cy="1291828"/>
           </a:xfrm>
           <a:prstGeom prst="bentConnector3">
             <a:avLst>
-              <a:gd name="adj1" fmla="val 19093"/>
+              <a:gd name="adj1" fmla="val 12853"/>
             </a:avLst>
           </a:prstGeom>
           <a:ln>
@@ -5429,8 +5430,8 @@
         </p:nvCxnSpPr>
         <p:spPr>
           <a:xfrm rot="5400000" flipH="1" flipV="1">
-            <a:off x="7894613" y="4395840"/>
-            <a:ext cx="992697" cy="1286731"/>
+            <a:off x="8466291" y="5100493"/>
+            <a:ext cx="1125673" cy="10400"/>
           </a:xfrm>
           <a:prstGeom prst="bentConnector3">
             <a:avLst>
@@ -5473,13 +5474,13 @@
           <p:nvPr/>
         </p:nvCxnSpPr>
         <p:spPr>
-          <a:xfrm rot="5400000" flipH="1" flipV="1">
-            <a:off x="8497574" y="4120259"/>
-            <a:ext cx="2017866" cy="812722"/>
+          <a:xfrm rot="16200000" flipV="1">
+            <a:off x="8951177" y="4479378"/>
+            <a:ext cx="2150842" cy="227459"/>
           </a:xfrm>
           <a:prstGeom prst="bentConnector3">
             <a:avLst>
-              <a:gd name="adj1" fmla="val 21206"/>
+              <a:gd name="adj1" fmla="val 50000"/>
             </a:avLst>
           </a:prstGeom>
           <a:ln>
@@ -5585,45 +5586,6 @@
                 <a:cs typeface="Segoe UI" panose="020B0502040204020203" pitchFamily="34" charset="0"/>
               </a:rPr>
               <a:t>DAC</a:t>
-            </a:r>
-          </a:p>
-        </p:txBody>
-      </p:sp>
-      <p:sp>
-        <p:nvSpPr>
-          <p:cNvPr id="168" name="TextBox 167">
-            <a:extLst>
-              <a:ext uri="{FF2B5EF4-FFF2-40B4-BE49-F238E27FC236}">
-                <a16:creationId xmlns:a16="http://schemas.microsoft.com/office/drawing/2014/main" id="{E84423D0-8B79-4AC0-A290-64DF4488DC85}"/>
-              </a:ext>
-            </a:extLst>
-          </p:cNvPr>
-          <p:cNvSpPr txBox="1"/>
-          <p:nvPr/>
-        </p:nvSpPr>
-        <p:spPr>
-          <a:xfrm>
-            <a:off x="4482601" y="3651220"/>
-            <a:ext cx="429926" cy="246221"/>
-          </a:xfrm>
-          <a:prstGeom prst="rect">
-            <a:avLst/>
-          </a:prstGeom>
-          <a:noFill/>
-        </p:spPr>
-        <p:txBody>
-          <a:bodyPr wrap="none" rtlCol="0">
-            <a:spAutoFit/>
-          </a:bodyPr>
-          <a:lstStyle/>
-          <a:p>
-            <a:pPr algn="ctr"/>
-            <a:r>
-              <a:rPr lang="en-US" sz="1000" dirty="0">
-                <a:latin typeface="Segoe UI" panose="020B0502040204020203" pitchFamily="34" charset="0"/>
-                <a:cs typeface="Segoe UI" panose="020B0502040204020203" pitchFamily="34" charset="0"/>
-              </a:rPr>
-              <a:t>DUT</a:t>
             </a:r>
           </a:p>
         </p:txBody>
@@ -6171,7 +6133,7 @@
         </p:nvSpPr>
         <p:spPr>
           <a:xfrm>
-            <a:off x="9159296" y="4258248"/>
+            <a:off x="9134666" y="4241553"/>
             <a:ext cx="694421" cy="400110"/>
           </a:xfrm>
           <a:prstGeom prst="rect">
@@ -6202,6 +6164,114 @@
                 <a:cs typeface="Segoe UI" panose="020B0502040204020203" pitchFamily="34" charset="0"/>
               </a:rPr>
               <a:t>oscillator</a:t>
+            </a:r>
+          </a:p>
+        </p:txBody>
+      </p:sp>
+      <p:sp>
+        <p:nvSpPr>
+          <p:cNvPr id="17" name="TextBox 16">
+            <a:extLst>
+              <a:ext uri="{FF2B5EF4-FFF2-40B4-BE49-F238E27FC236}">
+                <a16:creationId xmlns:a16="http://schemas.microsoft.com/office/drawing/2014/main" id="{FBD27FF0-8F40-4E8F-BD55-220AC5813DA0}"/>
+              </a:ext>
+            </a:extLst>
+          </p:cNvPr>
+          <p:cNvSpPr txBox="1"/>
+          <p:nvPr/>
+        </p:nvSpPr>
+        <p:spPr>
+          <a:xfrm>
+            <a:off x="4277396" y="4353670"/>
+            <a:ext cx="811889" cy="369332"/>
+          </a:xfrm>
+          <a:prstGeom prst="rect">
+            <a:avLst/>
+          </a:prstGeom>
+          <a:noFill/>
+        </p:spPr>
+        <p:txBody>
+          <a:bodyPr wrap="none" rtlCol="0">
+            <a:spAutoFit/>
+          </a:bodyPr>
+          <a:lstStyle/>
+          <a:p>
+            <a:pPr algn="ctr"/>
+            <a:r>
+              <a:rPr lang="en-US" dirty="0"/>
+              <a:t>Device</a:t>
+            </a:r>
+          </a:p>
+        </p:txBody>
+      </p:sp>
+      <p:sp>
+        <p:nvSpPr>
+          <p:cNvPr id="95" name="TextBox 94">
+            <a:extLst>
+              <a:ext uri="{FF2B5EF4-FFF2-40B4-BE49-F238E27FC236}">
+                <a16:creationId xmlns:a16="http://schemas.microsoft.com/office/drawing/2014/main" id="{27B12AC4-161D-4E70-B09A-ABF959C80F6B}"/>
+              </a:ext>
+            </a:extLst>
+          </p:cNvPr>
+          <p:cNvSpPr txBox="1"/>
+          <p:nvPr/>
+        </p:nvSpPr>
+        <p:spPr>
+          <a:xfrm>
+            <a:off x="2961371" y="4341069"/>
+            <a:ext cx="856325" cy="369332"/>
+          </a:xfrm>
+          <a:prstGeom prst="rect">
+            <a:avLst/>
+          </a:prstGeom>
+          <a:noFill/>
+        </p:spPr>
+        <p:txBody>
+          <a:bodyPr wrap="none" rtlCol="0">
+            <a:spAutoFit/>
+          </a:bodyPr>
+          <a:lstStyle/>
+          <a:p>
+            <a:pPr algn="ctr"/>
+            <a:r>
+              <a:rPr lang="en-US" dirty="0"/>
+              <a:t>Output</a:t>
+            </a:r>
+          </a:p>
+        </p:txBody>
+      </p:sp>
+      <p:sp>
+        <p:nvSpPr>
+          <p:cNvPr id="96" name="TextBox 95">
+            <a:extLst>
+              <a:ext uri="{FF2B5EF4-FFF2-40B4-BE49-F238E27FC236}">
+                <a16:creationId xmlns:a16="http://schemas.microsoft.com/office/drawing/2014/main" id="{0262ADCC-88AA-4C9E-B8BA-85D1D4046A5A}"/>
+              </a:ext>
+            </a:extLst>
+          </p:cNvPr>
+          <p:cNvSpPr txBox="1"/>
+          <p:nvPr/>
+        </p:nvSpPr>
+        <p:spPr>
+          <a:xfrm>
+            <a:off x="5568016" y="4341069"/>
+            <a:ext cx="684803" cy="369332"/>
+          </a:xfrm>
+          <a:prstGeom prst="rect">
+            <a:avLst/>
+          </a:prstGeom>
+          <a:noFill/>
+        </p:spPr>
+        <p:txBody>
+          <a:bodyPr wrap="none" rtlCol="0">
+            <a:spAutoFit/>
+          </a:bodyPr>
+          <a:lstStyle/>
+          <a:p>
+            <a:pPr algn="ctr"/>
+            <a:r>
+              <a:rPr lang="en-US" dirty="0"/>
+              <a:t>Input</a:t>
             </a:r>
           </a:p>
         </p:txBody>

</xml_diff>